<commit_message>
Update Báo cáo dự án - CTDL và GT.pptx
</commit_message>
<xml_diff>
--- a/Báo cáo dự án - CTDL và GT.pptx
+++ b/Báo cáo dự án - CTDL và GT.pptx
@@ -10930,7 +10930,7 @@
                 <a:ea typeface="+mn-lt"/>
                 <a:cs typeface="+mn-lt"/>
               </a:rPr>
-              <a:t>Phân</a:t>
+              <a:t>Mã</a:t>
             </a:r>
             <a:r>
               <a:rPr lang="en-US" sz="2000" dirty="0">
@@ -10938,7 +10938,7 @@
                 <a:ea typeface="+mn-lt"/>
                 <a:cs typeface="+mn-lt"/>
               </a:rPr>
-              <a:t> </a:t>
+              <a:t> </a:t>
             </a:r>
             <a:r>
               <a:rPr lang="en-US" sz="2000" dirty="0" err="1">
@@ -10946,7 +10946,7 @@
                 <a:ea typeface="+mn-lt"/>
                 <a:cs typeface="+mn-lt"/>
               </a:rPr>
-              <a:t>tách</a:t>
+              <a:t>hoá</a:t>
             </a:r>
             <a:r>
               <a:rPr lang="en-US" sz="2000" dirty="0">
@@ -10954,7 +10954,7 @@
                 <a:ea typeface="+mn-lt"/>
                 <a:cs typeface="+mn-lt"/>
               </a:rPr>
-              <a:t> </a:t>
+              <a:t> </a:t>
             </a:r>
             <a:r>
               <a:rPr lang="en-US" sz="2000" dirty="0" err="1">
@@ -10970,280 +10970,136 @@
                 <a:ea typeface="+mn-lt"/>
                 <a:cs typeface="+mn-lt"/>
               </a:rPr>
-              <a:t> </a:t>
+              <a:t> </a:t>
             </a:r>
             <a:r>
               <a:rPr lang="en-US" sz="2000" dirty="0" err="1">
-                <a:latin typeface="Calibri"/>
-                <a:ea typeface="+mn-lt"/>
-                <a:cs typeface="+mn-lt"/>
+                <a:latin typeface="Calibri" panose="020F0502020204030204" pitchFamily="34" charset="0"/>
+                <a:ea typeface="+mn-lt"/>
+                <a:cs typeface="Calibri" panose="020F0502020204030204" pitchFamily="34" charset="0"/>
+              </a:rPr>
+              <a:t>chuỗi</a:t>
+            </a:r>
+            <a:r>
+              <a:rPr lang="en-US" sz="2000" dirty="0">
+                <a:latin typeface="Calibri" panose="020F0502020204030204" pitchFamily="34" charset="0"/>
+                <a:ea typeface="+mn-lt"/>
+                <a:cs typeface="Calibri" panose="020F0502020204030204" pitchFamily="34" charset="0"/>
+              </a:rPr>
+              <a:t> </a:t>
+            </a:r>
+            <a:r>
+              <a:rPr lang="en-US" sz="2000" dirty="0" err="1">
+                <a:latin typeface="Calibri" panose="020F0502020204030204" pitchFamily="34" charset="0"/>
+                <a:ea typeface="+mn-lt"/>
+                <a:cs typeface="Calibri" panose="020F0502020204030204" pitchFamily="34" charset="0"/>
               </a:rPr>
               <a:t>âm</a:t>
             </a:r>
             <a:r>
               <a:rPr lang="en-US" sz="2000" dirty="0">
-                <a:latin typeface="Calibri"/>
-                <a:ea typeface="+mn-lt"/>
-                <a:cs typeface="+mn-lt"/>
-              </a:rPr>
-              <a:t> </a:t>
+                <a:latin typeface="Calibri" panose="020F0502020204030204" pitchFamily="34" charset="0"/>
+                <a:ea typeface="+mn-lt"/>
+                <a:cs typeface="Calibri" panose="020F0502020204030204" pitchFamily="34" charset="0"/>
+              </a:rPr>
+              <a:t> </a:t>
             </a:r>
             <a:r>
               <a:rPr lang="en-US" sz="2000" dirty="0" err="1">
-                <a:latin typeface="Calibri"/>
-                <a:ea typeface="+mn-lt"/>
-                <a:cs typeface="+mn-lt"/>
-              </a:rPr>
-              <a:t>trong</a:t>
+                <a:latin typeface="Calibri" panose="020F0502020204030204" pitchFamily="34" charset="0"/>
+                <a:ea typeface="+mn-lt"/>
+                <a:cs typeface="Calibri" panose="020F0502020204030204" pitchFamily="34" charset="0"/>
+              </a:rPr>
+              <a:t>Tiếng</a:t>
             </a:r>
             <a:r>
               <a:rPr lang="en-US" sz="2000" dirty="0">
-                <a:latin typeface="Calibri"/>
-                <a:ea typeface="+mn-lt"/>
-                <a:cs typeface="+mn-lt"/>
-              </a:rPr>
-              <a:t> </a:t>
+                <a:latin typeface="Calibri" panose="020F0502020204030204" pitchFamily="34" charset="0"/>
+                <a:ea typeface="+mn-lt"/>
+                <a:cs typeface="Calibri" panose="020F0502020204030204" pitchFamily="34" charset="0"/>
+              </a:rPr>
+              <a:t> </a:t>
             </a:r>
             <a:r>
               <a:rPr lang="en-US" sz="2000" dirty="0" err="1">
-                <a:latin typeface="Calibri"/>
-                <a:ea typeface="+mn-lt"/>
-                <a:cs typeface="+mn-lt"/>
-              </a:rPr>
-              <a:t>Tiếng</a:t>
+                <a:latin typeface="Calibri" panose="020F0502020204030204" pitchFamily="34" charset="0"/>
+                <a:ea typeface="+mn-lt"/>
+                <a:cs typeface="Calibri" panose="020F0502020204030204" pitchFamily="34" charset="0"/>
+              </a:rPr>
+              <a:t>Việt</a:t>
             </a:r>
             <a:r>
               <a:rPr lang="en-US" sz="2000" dirty="0">
-                <a:latin typeface="Calibri"/>
-                <a:ea typeface="+mn-lt"/>
-                <a:cs typeface="+mn-lt"/>
-              </a:rPr>
-              <a:t> Việt </a:t>
+                <a:latin typeface="Calibri" panose="020F0502020204030204" pitchFamily="34" charset="0"/>
+                <a:ea typeface="+mn-lt"/>
+                <a:cs typeface="Calibri" panose="020F0502020204030204" pitchFamily="34" charset="0"/>
+              </a:rPr>
+              <a:t> </a:t>
             </a:r>
             <a:r>
               <a:rPr lang="en-US" sz="2000" dirty="0" err="1">
-                <a:latin typeface="Calibri"/>
-                <a:ea typeface="+mn-lt"/>
-                <a:cs typeface="+mn-lt"/>
+                <a:latin typeface="Calibri" panose="020F0502020204030204" pitchFamily="34" charset="0"/>
+                <a:ea typeface="+mn-lt"/>
+                <a:cs typeface="Calibri" panose="020F0502020204030204" pitchFamily="34" charset="0"/>
               </a:rPr>
               <a:t>thành</a:t>
             </a:r>
             <a:r>
               <a:rPr lang="en-US" sz="2000" dirty="0">
-                <a:latin typeface="Calibri"/>
-                <a:ea typeface="+mn-lt"/>
-                <a:cs typeface="+mn-lt"/>
-              </a:rPr>
-              <a:t> </a:t>
-            </a:r>
-            <a:br>
-              <a:rPr lang="en-US" dirty="0">
-                <a:latin typeface="Calibri"/>
-              </a:rPr>
-            </a:br>
+                <a:latin typeface="Calibri" panose="020F0502020204030204" pitchFamily="34" charset="0"/>
+                <a:ea typeface="+mn-lt"/>
+                <a:cs typeface="Calibri" panose="020F0502020204030204" pitchFamily="34" charset="0"/>
+              </a:rPr>
+              <a:t> </a:t>
+            </a:r>
+            <a:r>
+              <a:rPr lang="en-US" sz="2000" dirty="0" err="1">
+                <a:latin typeface="Calibri" panose="020F0502020204030204" pitchFamily="34" charset="0"/>
+                <a:ea typeface="+mn-lt"/>
+                <a:cs typeface="Calibri" panose="020F0502020204030204" pitchFamily="34" charset="0"/>
+              </a:rPr>
+              <a:t>một</a:t>
+            </a:r>
             <a:r>
               <a:rPr lang="en-US" sz="2000" dirty="0">
-                <a:latin typeface="Calibri"/>
-                <a:ea typeface="+mn-lt"/>
-                <a:cs typeface="+mn-lt"/>
-              </a:rPr>
-              <a:t>3 </a:t>
+                <a:latin typeface="Calibri" panose="020F0502020204030204" pitchFamily="34" charset="0"/>
+                <a:ea typeface="+mn-lt"/>
+                <a:cs typeface="Calibri" panose="020F0502020204030204" pitchFamily="34" charset="0"/>
+              </a:rPr>
+              <a:t> </a:t>
             </a:r>
             <a:r>
               <a:rPr lang="en-US" sz="2000" dirty="0" err="1">
-                <a:latin typeface="Calibri"/>
-                <a:ea typeface="+mn-lt"/>
-                <a:cs typeface="+mn-lt"/>
-              </a:rPr>
-              <a:t>thành</a:t>
+                <a:latin typeface="Calibri" panose="020F0502020204030204" pitchFamily="34" charset="0"/>
+                <a:ea typeface="+mn-lt"/>
+                <a:cs typeface="Calibri" panose="020F0502020204030204" pitchFamily="34" charset="0"/>
+              </a:rPr>
+              <a:t>số</a:t>
             </a:r>
             <a:r>
               <a:rPr lang="en-US" sz="2000" dirty="0">
-                <a:latin typeface="Calibri"/>
-                <a:ea typeface="+mn-lt"/>
-                <a:cs typeface="+mn-lt"/>
-              </a:rPr>
-              <a:t> </a:t>
+                <a:latin typeface="Calibri" panose="020F0502020204030204" pitchFamily="34" charset="0"/>
+                <a:ea typeface="+mn-lt"/>
+                <a:cs typeface="Calibri" panose="020F0502020204030204" pitchFamily="34" charset="0"/>
+              </a:rPr>
+              <a:t> </a:t>
             </a:r>
             <a:r>
               <a:rPr lang="en-US" sz="2000" dirty="0" err="1">
-                <a:latin typeface="Calibri"/>
-                <a:ea typeface="+mn-lt"/>
-                <a:cs typeface="+mn-lt"/>
-              </a:rPr>
-              <a:t>phần</a:t>
+                <a:latin typeface="Calibri" panose="020F0502020204030204" pitchFamily="34" charset="0"/>
+                <a:ea typeface="+mn-lt"/>
+                <a:cs typeface="Calibri" panose="020F0502020204030204" pitchFamily="34" charset="0"/>
+              </a:rPr>
+              <a:t>nguyên</a:t>
             </a:r>
             <a:r>
               <a:rPr lang="en-US" sz="2000" dirty="0">
-                <a:latin typeface="Calibri"/>
-                <a:ea typeface="+mn-lt"/>
-                <a:cs typeface="+mn-lt"/>
-              </a:rPr>
-              <a:t>: </a:t>
-            </a:r>
-            <a:r>
-              <a:rPr lang="en-US" sz="2000" dirty="0" err="1">
-                <a:latin typeface="Calibri"/>
-                <a:ea typeface="+mn-lt"/>
-                <a:cs typeface="+mn-lt"/>
-              </a:rPr>
-              <a:t>phần</a:t>
-            </a:r>
-            <a:r>
-              <a:rPr lang="en-US" sz="2000" dirty="0">
-                <a:latin typeface="Calibri"/>
-                <a:ea typeface="+mn-lt"/>
-                <a:cs typeface="+mn-lt"/>
-              </a:rPr>
-              <a:t> </a:t>
-            </a:r>
-            <a:r>
-              <a:rPr lang="en-US" sz="2000" dirty="0" err="1">
-                <a:latin typeface="Calibri"/>
-                <a:ea typeface="+mn-lt"/>
-                <a:cs typeface="+mn-lt"/>
-              </a:rPr>
-              <a:t>bắt</a:t>
-            </a:r>
-            <a:r>
-              <a:rPr lang="en-US" sz="2000" dirty="0">
-                <a:latin typeface="Calibri"/>
-                <a:ea typeface="+mn-lt"/>
-                <a:cs typeface="+mn-lt"/>
-              </a:rPr>
-              <a:t> </a:t>
-            </a:r>
-            <a:r>
-              <a:rPr lang="en-US" sz="2000" dirty="0" err="1">
-                <a:latin typeface="Calibri"/>
-                <a:ea typeface="+mn-lt"/>
-                <a:cs typeface="+mn-lt"/>
-              </a:rPr>
-              <a:t>đầu</a:t>
-            </a:r>
-            <a:r>
-              <a:rPr lang="en-US" sz="2000" dirty="0">
-                <a:latin typeface="Calibri"/>
-                <a:ea typeface="+mn-lt"/>
-                <a:cs typeface="+mn-lt"/>
-              </a:rPr>
-              <a:t>, </a:t>
-            </a:r>
-            <a:r>
-              <a:rPr lang="en-US" sz="2000" dirty="0" err="1">
-                <a:latin typeface="Calibri"/>
-                <a:ea typeface="+mn-lt"/>
-                <a:cs typeface="+mn-lt"/>
-              </a:rPr>
-              <a:t>phần</a:t>
-            </a:r>
-            <a:r>
-              <a:rPr lang="en-US" sz="2000" dirty="0">
-                <a:latin typeface="Calibri"/>
-                <a:ea typeface="+mn-lt"/>
-                <a:cs typeface="+mn-lt"/>
-              </a:rPr>
-              <a:t> </a:t>
-            </a:r>
-            <a:r>
-              <a:rPr lang="en-US" sz="2000" dirty="0" err="1">
-                <a:latin typeface="Calibri"/>
-                <a:ea typeface="+mn-lt"/>
-                <a:cs typeface="+mn-lt"/>
-              </a:rPr>
-              <a:t>kết</a:t>
-            </a:r>
-            <a:r>
-              <a:rPr lang="en-US" sz="2000" dirty="0">
-                <a:latin typeface="Calibri"/>
-                <a:ea typeface="+mn-lt"/>
-                <a:cs typeface="+mn-lt"/>
-              </a:rPr>
-              <a:t> </a:t>
-            </a:r>
-            <a:r>
-              <a:rPr lang="en-US" sz="2000" dirty="0" err="1">
-                <a:latin typeface="Calibri"/>
-                <a:ea typeface="+mn-lt"/>
-                <a:cs typeface="+mn-lt"/>
-              </a:rPr>
-              <a:t>thúc</a:t>
-            </a:r>
-            <a:r>
-              <a:rPr lang="en-US" sz="2000" dirty="0">
-                <a:latin typeface="Calibri"/>
-                <a:ea typeface="+mn-lt"/>
-                <a:cs typeface="+mn-lt"/>
-              </a:rPr>
-              <a:t> </a:t>
-            </a:r>
-            <a:br>
-              <a:rPr lang="en-US" sz="2000" dirty="0">
-                <a:latin typeface="Calibri"/>
-                <a:ea typeface="+mn-lt"/>
-                <a:cs typeface="+mn-lt"/>
-              </a:rPr>
-            </a:br>
-            <a:r>
-              <a:rPr lang="en-US" sz="2000" dirty="0" err="1">
-                <a:latin typeface="Calibri"/>
-                <a:ea typeface="+mn-lt"/>
-                <a:cs typeface="+mn-lt"/>
-              </a:rPr>
-              <a:t>và</a:t>
-            </a:r>
-            <a:r>
-              <a:rPr lang="en-US" sz="2000" dirty="0">
-                <a:latin typeface="Calibri"/>
-                <a:ea typeface="+mn-lt"/>
-                <a:cs typeface="+mn-lt"/>
-              </a:rPr>
-              <a:t> </a:t>
-            </a:r>
-            <a:r>
-              <a:rPr lang="en-US" sz="2000" dirty="0" err="1">
-                <a:latin typeface="Calibri"/>
-                <a:ea typeface="+mn-lt"/>
-                <a:cs typeface="+mn-lt"/>
-              </a:rPr>
-              <a:t>phần</a:t>
-            </a:r>
-            <a:r>
-              <a:rPr lang="en-US" sz="2000" dirty="0">
-                <a:latin typeface="Calibri"/>
-                <a:ea typeface="+mn-lt"/>
-                <a:cs typeface="+mn-lt"/>
-              </a:rPr>
-              <a:t> </a:t>
-            </a:r>
-            <a:r>
-              <a:rPr lang="en-US" sz="2000" dirty="0" err="1">
-                <a:latin typeface="Calibri"/>
-                <a:ea typeface="+mn-lt"/>
-                <a:cs typeface="+mn-lt"/>
-              </a:rPr>
-              <a:t>dấu</a:t>
-            </a:r>
-            <a:r>
-              <a:rPr lang="en-US" sz="2000" dirty="0">
-                <a:latin typeface="Calibri"/>
-                <a:ea typeface="+mn-lt"/>
-                <a:cs typeface="+mn-lt"/>
-              </a:rPr>
-              <a:t>.</a:t>
-            </a:r>
-            <a:endParaRPr lang="en-US">
-              <a:latin typeface="Calibri"/>
-              <a:ea typeface="+mn-lt"/>
-              <a:cs typeface="+mn-lt"/>
-            </a:endParaRPr>
-          </a:p>
-          <a:p>
-            <a:pPr>
-              <a:buClr>
-                <a:srgbClr val="262626"/>
-              </a:buClr>
-            </a:pPr>
+                <a:latin typeface="Calibri" panose="020F0502020204030204" pitchFamily="34" charset="0"/>
+                <a:ea typeface="+mn-lt"/>
+                <a:cs typeface="Calibri" panose="020F0502020204030204" pitchFamily="34" charset="0"/>
+              </a:rPr>
+              <a:t> 16 bits.</a:t>
+            </a:r>
             <a:endParaRPr lang="en-US" sz="2000" dirty="0">
               <a:latin typeface="Calibri"/>
               <a:cs typeface="Calibri"/>
@@ -12312,24 +12168,122 @@
           <a:lstStyle/>
           <a:p>
             <a:r>
+              <a:rPr lang="en-US" sz="2000" dirty="0" err="1">
+                <a:latin typeface="Calibri"/>
+                <a:cs typeface="Calibri"/>
+              </a:rPr>
+              <a:t>Mã</a:t>
+            </a:r>
+            <a:r>
+              <a:rPr lang="en-US" sz="2000" dirty="0">
+                <a:latin typeface="Calibri"/>
+                <a:cs typeface="Calibri"/>
+              </a:rPr>
+              <a:t> </a:t>
+            </a:r>
+            <a:r>
+              <a:rPr lang="en-US" sz="2000" dirty="0" err="1">
+                <a:latin typeface="Calibri"/>
+                <a:cs typeface="Calibri"/>
+              </a:rPr>
+              <a:t>hoá</a:t>
+            </a:r>
+            <a:r>
+              <a:rPr lang="en-US" sz="2000" dirty="0">
+                <a:latin typeface="Calibri"/>
+                <a:cs typeface="Calibri"/>
+              </a:rPr>
+              <a:t> </a:t>
+            </a:r>
+            <a:r>
               <a:rPr lang="vi-VN" sz="2000" dirty="0" err="1">
                 <a:latin typeface="Calibri"/>
                 <a:cs typeface="Calibri"/>
               </a:rPr>
-              <a:t>Tách</a:t>
+              <a:t>chuỗi</a:t>
             </a:r>
             <a:r>
               <a:rPr lang="vi-VN" sz="2000" dirty="0">
                 <a:latin typeface="Calibri"/>
                 <a:cs typeface="Calibri"/>
               </a:rPr>
-              <a:t> </a:t>
+              <a:t> </a:t>
             </a:r>
             <a:r>
               <a:rPr lang="vi-VN" sz="2000" dirty="0" err="1">
                 <a:latin typeface="Calibri"/>
                 <a:cs typeface="Calibri"/>
               </a:rPr>
+              <a:t>từ</a:t>
+            </a:r>
+            <a:r>
+              <a:rPr lang="vi-VN" sz="2000" dirty="0">
+                <a:latin typeface="Calibri"/>
+                <a:cs typeface="Calibri"/>
+              </a:rPr>
+              <a:t> </a:t>
+            </a:r>
+            <a:r>
+              <a:rPr lang="vi-VN" sz="2000" dirty="0" err="1">
+                <a:latin typeface="Calibri"/>
+                <a:cs typeface="Calibri"/>
+              </a:rPr>
+              <a:t>Tiếng</a:t>
+            </a:r>
+            <a:r>
+              <a:rPr lang="vi-VN" sz="2000" dirty="0">
+                <a:latin typeface="Calibri"/>
+                <a:cs typeface="Calibri"/>
+              </a:rPr>
+              <a:t> </a:t>
+            </a:r>
+            <a:r>
+              <a:rPr lang="vi-VN" sz="2000" dirty="0" err="1">
+                <a:latin typeface="Calibri"/>
+                <a:cs typeface="Calibri"/>
+              </a:rPr>
+              <a:t>Việt</a:t>
+            </a:r>
+            <a:r>
+              <a:rPr lang="vi-VN" sz="2000" dirty="0">
+                <a:latin typeface="Calibri"/>
+                <a:cs typeface="Calibri"/>
+              </a:rPr>
+              <a:t> hai âm </a:t>
+            </a:r>
+            <a:r>
+              <a:rPr lang="vi-VN" sz="2000" dirty="0" err="1">
+                <a:latin typeface="Calibri"/>
+                <a:cs typeface="Calibri"/>
+              </a:rPr>
+              <a:t>tiết</a:t>
+            </a:r>
+            <a:r>
+              <a:rPr lang="vi-VN" sz="2000" dirty="0">
+                <a:latin typeface="Calibri"/>
+                <a:cs typeface="Calibri"/>
+              </a:rPr>
+              <a:t> </a:t>
+            </a:r>
+            <a:r>
+              <a:rPr lang="vi-VN" sz="2000" dirty="0" err="1">
+                <a:latin typeface="Calibri"/>
+                <a:cs typeface="Calibri"/>
+              </a:rPr>
+              <a:t>thành</a:t>
+            </a:r>
+            <a:r>
+              <a:rPr lang="vi-VN" sz="2000" dirty="0">
+                <a:latin typeface="Calibri"/>
+                <a:cs typeface="Calibri"/>
+              </a:rPr>
+              <a:t> </a:t>
+            </a:r>
+            <a:r>
+              <a:rPr lang="vi-VN" sz="2000" dirty="0" err="1">
+                <a:latin typeface="Calibri"/>
+                <a:cs typeface="Calibri"/>
+              </a:rPr>
               <a:t>một</a:t>
             </a:r>
             <a:r>
@@ -12337,273 +12291,35 @@
                 <a:latin typeface="Calibri"/>
                 <a:cs typeface="Calibri"/>
               </a:rPr>
-              <a:t> </a:t>
+              <a:t> </a:t>
             </a:r>
             <a:r>
               <a:rPr lang="vi-VN" sz="2000" dirty="0" err="1">
                 <a:latin typeface="Calibri"/>
                 <a:cs typeface="Calibri"/>
               </a:rPr>
-              <a:t>từ</a:t>
+              <a:t>số</a:t>
             </a:r>
             <a:r>
               <a:rPr lang="vi-VN" sz="2000" dirty="0">
                 <a:latin typeface="Calibri"/>
                 <a:cs typeface="Calibri"/>
               </a:rPr>
-              <a:t> </a:t>
+              <a:t> nguyên 32 </a:t>
             </a:r>
             <a:r>
               <a:rPr lang="vi-VN" sz="2000" dirty="0" err="1">
                 <a:latin typeface="Calibri"/>
                 <a:cs typeface="Calibri"/>
               </a:rPr>
-              <a:t>thành</a:t>
+              <a:t>bits</a:t>
             </a:r>
             <a:r>
               <a:rPr lang="vi-VN" sz="2000" dirty="0">
                 <a:latin typeface="Calibri"/>
                 <a:cs typeface="Calibri"/>
               </a:rPr>
-              <a:t> hai </a:t>
-            </a:r>
-            <a:r>
-              <a:rPr lang="vi-VN" sz="2000" dirty="0">
-                <a:latin typeface="Calibri"/>
-              </a:rPr>
-              <a:t>âm</a:t>
-            </a:r>
-            <a:r>
-              <a:rPr lang="vi-VN" sz="2000" dirty="0">
-                <a:latin typeface="Calibri"/>
-                <a:cs typeface="Calibri"/>
-              </a:rPr>
-              <a:t> </a:t>
-            </a:r>
-            <a:r>
-              <a:rPr lang="vi-VN" sz="2000" dirty="0" err="1">
-                <a:latin typeface="Calibri"/>
-                <a:cs typeface="Calibri"/>
-              </a:rPr>
-              <a:t>tiết</a:t>
-            </a:r>
-            <a:r>
-              <a:rPr lang="vi-VN" sz="2000" dirty="0">
-                <a:latin typeface="Calibri"/>
-                <a:cs typeface="Calibri"/>
-              </a:rPr>
-              <a:t> </a:t>
-            </a:r>
-            <a:r>
-              <a:rPr lang="vi-VN" sz="2000" dirty="0" err="1">
-                <a:latin typeface="Calibri"/>
-                <a:cs typeface="Calibri"/>
-              </a:rPr>
-              <a:t>sử</a:t>
-            </a:r>
-            <a:r>
-              <a:rPr lang="vi-VN" sz="2000" dirty="0">
-                <a:latin typeface="Calibri"/>
-                <a:cs typeface="Calibri"/>
-              </a:rPr>
-              <a:t> </a:t>
-            </a:r>
-            <a:r>
-              <a:rPr lang="vi-VN" sz="2000" dirty="0" err="1">
-                <a:latin typeface="Calibri"/>
-                <a:cs typeface="Calibri"/>
-              </a:rPr>
-              <a:t>dụng</a:t>
-            </a:r>
-            <a:r>
-              <a:rPr lang="vi-VN" sz="2000" dirty="0">
-                <a:latin typeface="Calibri"/>
-                <a:cs typeface="Calibri"/>
-              </a:rPr>
-              <a:t> 16 </a:t>
-            </a:r>
-            <a:r>
-              <a:rPr lang="vi-VN" sz="2000" dirty="0" err="1">
-                <a:latin typeface="Calibri"/>
-                <a:cs typeface="Calibri"/>
-              </a:rPr>
-              <a:t>bits</a:t>
-            </a:r>
-            <a:r>
-              <a:rPr lang="vi-VN" sz="2000" dirty="0">
-                <a:latin typeface="Calibri"/>
-                <a:cs typeface="Calibri"/>
-              </a:rPr>
-              <a:t> </a:t>
-            </a:r>
-            <a:r>
-              <a:rPr lang="vi-VN" sz="2000" dirty="0" err="1">
-                <a:latin typeface="Calibri"/>
-              </a:rPr>
-              <a:t>đầu</a:t>
-            </a:r>
-            <a:br>
-              <a:rPr lang="vi-VN" sz="2000" dirty="0">
-                <a:latin typeface="Calibri"/>
-                <a:cs typeface="Calibri"/>
-              </a:rPr>
-            </a:br>
-            <a:r>
-              <a:rPr lang="vi-VN" sz="2000" dirty="0" err="1">
-                <a:latin typeface="Calibri"/>
-              </a:rPr>
-              <a:t>để</a:t>
-            </a:r>
-            <a:r>
-              <a:rPr lang="vi-VN" sz="2000" dirty="0">
-                <a:latin typeface="Calibri"/>
-                <a:cs typeface="Calibri"/>
-              </a:rPr>
-              <a:t> lưu </a:t>
-            </a:r>
-            <a:r>
-              <a:rPr lang="vi-VN" sz="2000" dirty="0" err="1">
-                <a:latin typeface="Calibri"/>
-                <a:cs typeface="Calibri"/>
-              </a:rPr>
-              <a:t>trữ</a:t>
-            </a:r>
-            <a:r>
-              <a:rPr lang="vi-VN" sz="2000" dirty="0">
-                <a:latin typeface="Calibri"/>
-                <a:cs typeface="Calibri"/>
-              </a:rPr>
-              <a:t> </a:t>
-            </a:r>
-            <a:r>
-              <a:rPr lang="vi-VN" sz="2000" dirty="0" err="1">
-                <a:latin typeface="Calibri"/>
-                <a:cs typeface="Calibri"/>
-              </a:rPr>
-              <a:t>từ</a:t>
-            </a:r>
-            <a:r>
-              <a:rPr lang="vi-VN" sz="2000" dirty="0">
-                <a:latin typeface="Calibri"/>
-                <a:cs typeface="Calibri"/>
-              </a:rPr>
-              <a:t> </a:t>
-            </a:r>
-            <a:r>
-              <a:rPr lang="vi-VN" sz="2000" dirty="0" err="1">
-                <a:latin typeface="Calibri"/>
-              </a:rPr>
-              <a:t>đầu</a:t>
-            </a:r>
-            <a:r>
-              <a:rPr lang="vi-VN" sz="2000" dirty="0">
-                <a:latin typeface="Calibri"/>
-                <a:cs typeface="Calibri"/>
-              </a:rPr>
-              <a:t> tiên </a:t>
-            </a:r>
-            <a:r>
-              <a:rPr lang="vi-VN" sz="2000" dirty="0" err="1">
-                <a:latin typeface="Calibri"/>
-                <a:cs typeface="Calibri"/>
-              </a:rPr>
-              <a:t>và</a:t>
-            </a:r>
-            <a:r>
-              <a:rPr lang="vi-VN" sz="2000" dirty="0">
-                <a:latin typeface="Calibri"/>
-                <a:cs typeface="Calibri"/>
-              </a:rPr>
-              <a:t> 16 </a:t>
-            </a:r>
-            <a:r>
-              <a:rPr lang="vi-VN" sz="2000" dirty="0" err="1">
-                <a:latin typeface="Calibri"/>
-                <a:cs typeface="Calibri"/>
-              </a:rPr>
-              <a:t>bits</a:t>
-            </a:r>
-            <a:r>
-              <a:rPr lang="vi-VN" sz="2000" dirty="0">
-                <a:latin typeface="Calibri"/>
-                <a:cs typeface="Calibri"/>
-              </a:rPr>
-              <a:t> </a:t>
-            </a:r>
-            <a:r>
-              <a:rPr lang="vi-VN" sz="2000" dirty="0" err="1">
-                <a:latin typeface="Calibri"/>
-                <a:cs typeface="Calibri"/>
-              </a:rPr>
-              <a:t>tiếp</a:t>
-            </a:r>
-            <a:r>
-              <a:rPr lang="vi-VN" sz="2000" dirty="0">
-                <a:latin typeface="Calibri"/>
-                <a:cs typeface="Calibri"/>
-              </a:rPr>
-              <a:t> theo </a:t>
-            </a:r>
-            <a:r>
-              <a:rPr lang="vi-VN" sz="2000" dirty="0" err="1">
-                <a:latin typeface="Calibri"/>
-              </a:rPr>
-              <a:t>để</a:t>
-            </a:r>
-            <a:r>
-              <a:rPr lang="vi-VN" sz="2000" dirty="0">
-                <a:latin typeface="Calibri"/>
-                <a:cs typeface="Calibri"/>
-              </a:rPr>
-              <a:t> lưu </a:t>
-            </a:r>
-            <a:br>
-              <a:rPr lang="vi-VN" sz="2000" dirty="0">
-                <a:latin typeface="Calibri"/>
-                <a:cs typeface="Calibri"/>
-              </a:rPr>
-            </a:br>
-            <a:r>
-              <a:rPr lang="vi-VN" sz="2000" dirty="0" err="1">
-                <a:latin typeface="Calibri"/>
-                <a:cs typeface="Calibri"/>
-              </a:rPr>
-              <a:t>trữ</a:t>
-            </a:r>
-            <a:r>
-              <a:rPr lang="vi-VN" sz="2000" dirty="0">
-                <a:latin typeface="Calibri"/>
-                <a:cs typeface="Calibri"/>
-              </a:rPr>
-              <a:t> </a:t>
-            </a:r>
-            <a:r>
-              <a:rPr lang="vi-VN" sz="2000" dirty="0" err="1">
-                <a:latin typeface="Calibri"/>
-                <a:cs typeface="Calibri"/>
-              </a:rPr>
-              <a:t>từ</a:t>
-            </a:r>
-            <a:r>
-              <a:rPr lang="vi-VN" sz="2000" dirty="0">
-                <a:latin typeface="Calibri"/>
-                <a:cs typeface="Calibri"/>
-              </a:rPr>
-              <a:t> </a:t>
-            </a:r>
-            <a:r>
-              <a:rPr lang="vi-VN" sz="2000" dirty="0" err="1">
-                <a:latin typeface="Calibri"/>
-                <a:cs typeface="Calibri"/>
-              </a:rPr>
-              <a:t>thứ</a:t>
-            </a:r>
-            <a:r>
-              <a:rPr lang="vi-VN" sz="2000" dirty="0">
-                <a:latin typeface="Calibri"/>
-                <a:cs typeface="Calibri"/>
-              </a:rPr>
-              <a:t> hai. </a:t>
+              <a:t>. </a:t>
             </a:r>
             <a:endParaRPr lang="vi-VN" sz="2000" dirty="0">
               <a:latin typeface="Calibri"/>
@@ -27940,6 +27656,50 @@
                 <a:latin typeface="Calibri"/>
                 <a:cs typeface="Calibri"/>
               </a:rPr>
+              <a:t>Đọc</a:t>
+            </a:r>
+            <a:r>
+              <a:rPr lang="en-US" sz="2000" dirty="0">
+                <a:latin typeface="Calibri"/>
+                <a:cs typeface="Calibri"/>
+              </a:rPr>
+              <a:t> </a:t>
+            </a:r>
+            <a:r>
+              <a:rPr lang="en-US" sz="2000" dirty="0" err="1">
+                <a:latin typeface="Calibri"/>
+                <a:cs typeface="Calibri"/>
+              </a:rPr>
+              <a:t>từ</a:t>
+            </a:r>
+            <a:r>
+              <a:rPr lang="en-US" sz="2000" dirty="0">
+                <a:latin typeface="Calibri"/>
+                <a:cs typeface="Calibri"/>
+              </a:rPr>
+              <a:t> </a:t>
+            </a:r>
+            <a:r>
+              <a:rPr lang="en-US" sz="2000" dirty="0" err="1">
+                <a:latin typeface="Calibri"/>
+                <a:cs typeface="Calibri"/>
+              </a:rPr>
+              <a:t>tệp</a:t>
+            </a:r>
+            <a:r>
+              <a:rPr lang="en-US" sz="2000" dirty="0">
+                <a:latin typeface="Calibri"/>
+                <a:cs typeface="Calibri"/>
+              </a:rPr>
+              <a:t> dictionary.txt.</a:t>
+            </a:r>
+          </a:p>
+          <a:p>
+            <a:r>
+              <a:rPr lang="en-US" sz="2000" dirty="0" err="1">
+                <a:latin typeface="Calibri"/>
+                <a:cs typeface="Calibri"/>
+              </a:rPr>
               <a:t>Cấu</a:t>
             </a:r>
             <a:r>
@@ -27970,167 +27730,112 @@
               <a:buClr>
                 <a:srgbClr val="262626"/>
               </a:buClr>
+              <a:buFont typeface="Garamond" pitchFamily="18" charset="0"/>
               <a:buAutoNum type="arabicPeriod"/>
             </a:pPr>
             <a:r>
               <a:rPr lang="en-US" sz="2000" dirty="0">
                 <a:latin typeface="Calibri"/>
-                <a:cs typeface="Calibri"/>
-              </a:rPr>
-              <a:t>Key : </a:t>
+                <a:ea typeface="+mn-lt"/>
+                <a:cs typeface="+mn-lt"/>
+              </a:rPr>
+              <a:t>Hash function :  </a:t>
             </a:r>
             <a:r>
               <a:rPr lang="en-US" sz="2000" dirty="0" err="1">
                 <a:latin typeface="Calibri"/>
-                <a:cs typeface="Calibri"/>
+                <a:ea typeface="+mn-lt"/>
+                <a:cs typeface="+mn-lt"/>
+              </a:rPr>
+              <a:t>Hàm</a:t>
+            </a:r>
+            <a:r>
+              <a:rPr lang="en-US" sz="2000" dirty="0">
+                <a:latin typeface="Calibri"/>
+                <a:ea typeface="+mn-lt"/>
+                <a:cs typeface="+mn-lt"/>
+              </a:rPr>
+              <a:t> </a:t>
+            </a:r>
+            <a:r>
+              <a:rPr lang="en-US" sz="2000" dirty="0" err="1">
+                <a:latin typeface="Calibri"/>
+                <a:ea typeface="+mn-lt"/>
+                <a:cs typeface="+mn-lt"/>
+              </a:rPr>
+              <a:t>mã</a:t>
+            </a:r>
+            <a:r>
+              <a:rPr lang="en-US" sz="2000" dirty="0">
+                <a:latin typeface="Calibri"/>
+                <a:ea typeface="+mn-lt"/>
+                <a:cs typeface="+mn-lt"/>
+              </a:rPr>
+              <a:t> </a:t>
+            </a:r>
+            <a:r>
+              <a:rPr lang="en-US" sz="2000" dirty="0" err="1">
+                <a:latin typeface="Calibri"/>
+                <a:ea typeface="+mn-lt"/>
+                <a:cs typeface="+mn-lt"/>
+              </a:rPr>
+              <a:t>hoá</a:t>
+            </a:r>
+            <a:r>
+              <a:rPr lang="en-US" sz="2000" dirty="0">
+                <a:latin typeface="Calibri"/>
+                <a:ea typeface="+mn-lt"/>
+                <a:cs typeface="+mn-lt"/>
+              </a:rPr>
+              <a:t> </a:t>
+            </a:r>
+            <a:r>
+              <a:rPr lang="en-US" sz="2000" dirty="0" err="1">
+                <a:latin typeface="Calibri"/>
+                <a:ea typeface="+mn-lt"/>
+                <a:cs typeface="+mn-lt"/>
               </a:rPr>
               <a:t>âm</a:t>
             </a:r>
             <a:r>
               <a:rPr lang="en-US" sz="2000" dirty="0">
                 <a:latin typeface="Calibri"/>
-                <a:cs typeface="Calibri"/>
-              </a:rPr>
-              <a:t> </a:t>
+                <a:ea typeface="+mn-lt"/>
+                <a:cs typeface="+mn-lt"/>
+              </a:rPr>
+              <a:t> </a:t>
             </a:r>
             <a:r>
               <a:rPr lang="en-US" sz="2000" dirty="0" err="1">
                 <a:latin typeface="Calibri"/>
-                <a:cs typeface="Calibri"/>
-              </a:rPr>
-              <a:t>bắt</a:t>
+                <a:ea typeface="+mn-lt"/>
+                <a:cs typeface="+mn-lt"/>
+              </a:rPr>
+              <a:t>Tiếng</a:t>
             </a:r>
             <a:r>
               <a:rPr lang="en-US" sz="2000" dirty="0">
                 <a:latin typeface="Calibri"/>
-                <a:cs typeface="Calibri"/>
-              </a:rPr>
-              <a:t> </a:t>
+                <a:ea typeface="+mn-lt"/>
+                <a:cs typeface="+mn-lt"/>
+              </a:rPr>
+              <a:t> </a:t>
             </a:r>
             <a:r>
               <a:rPr lang="en-US" sz="2000" dirty="0" err="1">
                 <a:latin typeface="Calibri"/>
-                <a:cs typeface="Calibri"/>
-              </a:rPr>
-              <a:t>đầu</a:t>
+                <a:ea typeface="+mn-lt"/>
+                <a:cs typeface="+mn-lt"/>
+              </a:rPr>
+              <a:t>Việt</a:t>
             </a:r>
             <a:r>
               <a:rPr lang="en-US" sz="2000" dirty="0">
                 <a:latin typeface="Calibri"/>
-                <a:cs typeface="Calibri"/>
-              </a:rPr>
-              <a:t>.</a:t>
-            </a:r>
-          </a:p>
-          <a:p>
-            <a:pPr marL="731520" lvl="1" indent="-457200">
-              <a:buClr>
-                <a:srgbClr val="262626"/>
-              </a:buClr>
-              <a:buAutoNum type="arabicPeriod"/>
-            </a:pPr>
-            <a:r>
-              <a:rPr lang="en-US" sz="2000" dirty="0">
-                <a:latin typeface="Calibri"/>
-                <a:cs typeface="Calibri"/>
-              </a:rPr>
-              <a:t>Value : </a:t>
-            </a:r>
-            <a:r>
-              <a:rPr lang="en-US" sz="2000" dirty="0" err="1">
-                <a:latin typeface="Calibri"/>
-                <a:ea typeface="+mn-lt"/>
-                <a:cs typeface="+mn-lt"/>
-              </a:rPr>
-              <a:t>Một</a:t>
-            </a:r>
-            <a:r>
-              <a:rPr lang="en-US" sz="2000" dirty="0">
-                <a:latin typeface="Calibri"/>
-                <a:ea typeface="+mn-lt"/>
-                <a:cs typeface="+mn-lt"/>
-              </a:rPr>
-              <a:t> </a:t>
-            </a:r>
-            <a:r>
-              <a:rPr lang="en-US" sz="2000" dirty="0" err="1">
-                <a:latin typeface="Calibri"/>
-                <a:ea typeface="+mn-lt"/>
-                <a:cs typeface="+mn-lt"/>
-              </a:rPr>
-              <a:t>danh</a:t>
-            </a:r>
-            <a:r>
-              <a:rPr lang="en-US" sz="2000" dirty="0">
-                <a:latin typeface="Calibri"/>
-                <a:ea typeface="+mn-lt"/>
-                <a:cs typeface="+mn-lt"/>
-              </a:rPr>
-              <a:t> </a:t>
-            </a:r>
-            <a:r>
-              <a:rPr lang="en-US" sz="2000" dirty="0" err="1">
-                <a:latin typeface="Calibri"/>
-                <a:ea typeface="+mn-lt"/>
-                <a:cs typeface="+mn-lt"/>
-              </a:rPr>
-              <a:t>sách</a:t>
-            </a:r>
-            <a:r>
-              <a:rPr lang="en-US" sz="2000" dirty="0">
-                <a:latin typeface="Calibri"/>
-                <a:ea typeface="+mn-lt"/>
-                <a:cs typeface="+mn-lt"/>
-              </a:rPr>
-              <a:t> </a:t>
-            </a:r>
-            <a:r>
-              <a:rPr lang="en-US" sz="2000" dirty="0" err="1">
-                <a:latin typeface="Calibri"/>
-                <a:ea typeface="+mn-lt"/>
-                <a:cs typeface="+mn-lt"/>
-              </a:rPr>
-              <a:t>mảng</a:t>
-            </a:r>
-            <a:r>
-              <a:rPr lang="en-US" sz="2000" dirty="0">
-                <a:latin typeface="Calibri"/>
-                <a:ea typeface="+mn-lt"/>
-                <a:cs typeface="+mn-lt"/>
-              </a:rPr>
-              <a:t> (con </a:t>
-            </a:r>
-            <a:r>
-              <a:rPr lang="en-US" sz="2000" dirty="0" err="1">
-                <a:latin typeface="Calibri"/>
-                <a:ea typeface="+mn-lt"/>
-                <a:cs typeface="+mn-lt"/>
-              </a:rPr>
-              <a:t>trỏ</a:t>
-            </a:r>
-            <a:r>
-              <a:rPr lang="en-US" sz="2000" dirty="0">
-                <a:latin typeface="Calibri"/>
-                <a:ea typeface="+mn-lt"/>
-                <a:cs typeface="+mn-lt"/>
-              </a:rPr>
-              <a:t>) </a:t>
-            </a:r>
-            <a:r>
-              <a:rPr lang="en-US" sz="2000" dirty="0" err="1">
-                <a:latin typeface="Calibri"/>
-                <a:ea typeface="+mn-lt"/>
-                <a:cs typeface="+mn-lt"/>
-              </a:rPr>
-              <a:t>chứa</a:t>
-            </a:r>
-            <a:r>
-              <a:rPr lang="en-US" sz="2000" dirty="0">
-                <a:latin typeface="Calibri"/>
-                <a:ea typeface="+mn-lt"/>
-                <a:cs typeface="+mn-lt"/>
-              </a:rPr>
-              <a:t> </a:t>
+                <a:ea typeface="+mn-lt"/>
+                <a:cs typeface="+mn-lt"/>
+              </a:rPr>
+              <a:t>. </a:t>
             </a:r>
             <a:br>
               <a:rPr lang="en-US" sz="2000" dirty="0">
@@ -28145,7 +27850,7 @@
                 <a:ea typeface="+mn-lt"/>
                 <a:cs typeface="+mn-lt"/>
               </a:rPr>
-              <a:t>các</a:t>
+              <a:t>Giá</a:t>
             </a:r>
             <a:r>
               <a:rPr lang="en-US" sz="2000" dirty="0">
@@ -28161,7 +27866,7 @@
                 <a:ea typeface="+mn-lt"/>
                 <a:cs typeface="+mn-lt"/>
               </a:rPr>
-              <a:t>mã</a:t>
+              <a:t>trị</a:t>
             </a:r>
             <a:r>
               <a:rPr lang="en-US" sz="2000" dirty="0">
@@ -28177,7 +27882,7 @@
                 <a:ea typeface="+mn-lt"/>
                 <a:cs typeface="+mn-lt"/>
               </a:rPr>
-              <a:t>hoá</a:t>
+              <a:t>trong</a:t>
             </a:r>
             <a:r>
               <a:rPr lang="en-US" sz="2000" dirty="0">
@@ -28193,7 +27898,7 @@
                 <a:ea typeface="+mn-lt"/>
                 <a:cs typeface="+mn-lt"/>
               </a:rPr>
-              <a:t>của</a:t>
+              <a:t>đoạn</a:t>
             </a:r>
             <a:r>
               <a:rPr lang="en-US" sz="2000" dirty="0">
@@ -28209,7 +27914,7 @@
                 <a:ea typeface="+mn-lt"/>
                 <a:cs typeface="+mn-lt"/>
               </a:rPr>
-              <a:t>các</a:t>
+              <a:t>từ</a:t>
             </a:r>
             <a:r>
               <a:rPr lang="en-US" sz="2000" dirty="0">
@@ -28217,7 +27922,7 @@
                 <a:ea typeface="+mn-lt"/>
                 <a:cs typeface="+mn-lt"/>
               </a:rPr>
-              <a:t> </a:t>
+              <a:t> 0 </a:t>
             </a:r>
             <a:r>
               <a:rPr lang="en-US" sz="2000" dirty="0" err="1">
@@ -28225,7 +27930,7 @@
                 <a:ea typeface="+mn-lt"/>
                 <a:cs typeface="+mn-lt"/>
               </a:rPr>
-              <a:t>âm</a:t>
+              <a:t>đến</a:t>
             </a:r>
             <a:r>
               <a:rPr lang="en-US" sz="2000" dirty="0">
@@ -28233,492 +27938,7 @@
                 <a:ea typeface="+mn-lt"/>
                 <a:cs typeface="+mn-lt"/>
               </a:rPr>
-              <a:t> </a:t>
-            </a:r>
-            <a:r>
-              <a:rPr lang="en-US" sz="2000" dirty="0" err="1">
-                <a:latin typeface="Calibri"/>
-                <a:ea typeface="+mn-lt"/>
-                <a:cs typeface="+mn-lt"/>
-              </a:rPr>
-              <a:t>kết</a:t>
-            </a:r>
-            <a:r>
-              <a:rPr lang="en-US" sz="2000" dirty="0">
-                <a:latin typeface="Calibri"/>
-                <a:ea typeface="+mn-lt"/>
-                <a:cs typeface="+mn-lt"/>
-              </a:rPr>
-              <a:t> </a:t>
-            </a:r>
-            <a:r>
-              <a:rPr lang="en-US" sz="2000" dirty="0" err="1">
-                <a:latin typeface="Calibri"/>
-                <a:ea typeface="+mn-lt"/>
-                <a:cs typeface="+mn-lt"/>
-              </a:rPr>
-              <a:t>thúc</a:t>
-            </a:r>
-            <a:r>
-              <a:rPr lang="en-US" sz="2000" dirty="0">
-                <a:latin typeface="Calibri"/>
-                <a:ea typeface="+mn-lt"/>
-                <a:cs typeface="+mn-lt"/>
-              </a:rPr>
-              <a:t> </a:t>
-            </a:r>
-            <a:r>
-              <a:rPr lang="en-US" sz="2000" dirty="0" err="1">
-                <a:latin typeface="Calibri"/>
-                <a:ea typeface="+mn-lt"/>
-                <a:cs typeface="+mn-lt"/>
-              </a:rPr>
-              <a:t>của</a:t>
-            </a:r>
-            <a:r>
-              <a:rPr lang="en-US" sz="2000" dirty="0">
-                <a:latin typeface="Calibri"/>
-                <a:ea typeface="+mn-lt"/>
-                <a:cs typeface="+mn-lt"/>
-              </a:rPr>
-              <a:t> </a:t>
-            </a:r>
-            <a:r>
-              <a:rPr lang="en-US" sz="2000" dirty="0" err="1">
-                <a:latin typeface="Calibri"/>
-                <a:ea typeface="+mn-lt"/>
-                <a:cs typeface="+mn-lt"/>
-              </a:rPr>
-              <a:t>các</a:t>
-            </a:r>
-            <a:r>
-              <a:rPr lang="en-US" sz="2000" dirty="0">
-                <a:latin typeface="Calibri"/>
-                <a:ea typeface="+mn-lt"/>
-                <a:cs typeface="+mn-lt"/>
-              </a:rPr>
-              <a:t> </a:t>
-            </a:r>
-            <a:r>
-              <a:rPr lang="en-US" sz="2000" dirty="0" err="1">
-                <a:latin typeface="Calibri"/>
-                <a:ea typeface="+mn-lt"/>
-                <a:cs typeface="+mn-lt"/>
-              </a:rPr>
-              <a:t>từ</a:t>
-            </a:r>
-            <a:r>
-              <a:rPr lang="en-US" sz="2000" dirty="0">
-                <a:latin typeface="Calibri"/>
-                <a:ea typeface="+mn-lt"/>
-                <a:cs typeface="+mn-lt"/>
-              </a:rPr>
-              <a:t> </a:t>
-            </a:r>
-            <a:br>
-              <a:rPr lang="en-US" sz="2000" dirty="0">
-                <a:latin typeface="Calibri"/>
-                <a:ea typeface="+mn-lt"/>
-                <a:cs typeface="+mn-lt"/>
-              </a:rPr>
-            </a:br>
-            <a:r>
-              <a:rPr lang="en-US" sz="2000" dirty="0" err="1">
-                <a:latin typeface="Calibri"/>
-                <a:ea typeface="+mn-lt"/>
-                <a:cs typeface="+mn-lt"/>
-              </a:rPr>
-              <a:t>vựng</a:t>
-            </a:r>
-            <a:r>
-              <a:rPr lang="en-US" sz="2000" dirty="0">
-                <a:latin typeface="Calibri"/>
-                <a:ea typeface="+mn-lt"/>
-                <a:cs typeface="+mn-lt"/>
-              </a:rPr>
-              <a:t> </a:t>
-            </a:r>
-            <a:r>
-              <a:rPr lang="en-US" sz="2000" dirty="0" err="1">
-                <a:latin typeface="Calibri"/>
-                <a:ea typeface="+mn-lt"/>
-                <a:cs typeface="+mn-lt"/>
-              </a:rPr>
-              <a:t>tương</a:t>
-            </a:r>
-            <a:r>
-              <a:rPr lang="en-US" sz="2000" dirty="0">
-                <a:latin typeface="Calibri"/>
-                <a:ea typeface="+mn-lt"/>
-                <a:cs typeface="+mn-lt"/>
-              </a:rPr>
-              <a:t> </a:t>
-            </a:r>
-            <a:r>
-              <a:rPr lang="en-US" sz="2000" dirty="0" err="1">
-                <a:latin typeface="Calibri"/>
-                <a:ea typeface="+mn-lt"/>
-                <a:cs typeface="+mn-lt"/>
-              </a:rPr>
-              <a:t>ứng</a:t>
-            </a:r>
-            <a:r>
-              <a:rPr lang="en-US" sz="2000" dirty="0">
-                <a:latin typeface="Calibri"/>
-                <a:ea typeface="+mn-lt"/>
-                <a:cs typeface="+mn-lt"/>
-              </a:rPr>
-              <a:t> </a:t>
-            </a:r>
-            <a:r>
-              <a:rPr lang="en-US" sz="2000" dirty="0" err="1">
-                <a:latin typeface="Calibri"/>
-                <a:ea typeface="+mn-lt"/>
-                <a:cs typeface="+mn-lt"/>
-              </a:rPr>
-              <a:t>với</a:t>
-            </a:r>
-            <a:r>
-              <a:rPr lang="en-US" sz="2000" dirty="0">
-                <a:latin typeface="Calibri"/>
-                <a:ea typeface="+mn-lt"/>
-                <a:cs typeface="+mn-lt"/>
-              </a:rPr>
-              <a:t> </a:t>
-            </a:r>
-            <a:r>
-              <a:rPr lang="en-US" sz="2000" dirty="0" err="1">
-                <a:latin typeface="Calibri"/>
-                <a:ea typeface="+mn-lt"/>
-                <a:cs typeface="+mn-lt"/>
-              </a:rPr>
-              <a:t>giá</a:t>
-            </a:r>
-            <a:r>
-              <a:rPr lang="en-US" sz="2000" dirty="0">
-                <a:latin typeface="Calibri"/>
-                <a:ea typeface="+mn-lt"/>
-                <a:cs typeface="+mn-lt"/>
-              </a:rPr>
-              <a:t> </a:t>
-            </a:r>
-            <a:r>
-              <a:rPr lang="en-US" sz="2000" dirty="0" err="1">
-                <a:latin typeface="Calibri"/>
-                <a:ea typeface="+mn-lt"/>
-                <a:cs typeface="+mn-lt"/>
-              </a:rPr>
-              <a:t>trị</a:t>
-            </a:r>
-            <a:r>
-              <a:rPr lang="en-US" sz="2000" dirty="0">
-                <a:latin typeface="Calibri"/>
-                <a:ea typeface="+mn-lt"/>
-                <a:cs typeface="+mn-lt"/>
-              </a:rPr>
-              <a:t> </a:t>
-            </a:r>
-            <a:r>
-              <a:rPr lang="en-US" sz="2000" dirty="0" err="1">
-                <a:latin typeface="Calibri"/>
-                <a:ea typeface="+mn-lt"/>
-                <a:cs typeface="+mn-lt"/>
-              </a:rPr>
-              <a:t>băm</a:t>
-            </a:r>
-            <a:r>
-              <a:rPr lang="en-US" sz="2000" dirty="0">
-                <a:latin typeface="Calibri"/>
-                <a:ea typeface="+mn-lt"/>
-                <a:cs typeface="+mn-lt"/>
-              </a:rPr>
-              <a:t> </a:t>
-            </a:r>
-            <a:r>
-              <a:rPr lang="en-US" sz="2000" dirty="0" err="1">
-                <a:latin typeface="Calibri"/>
-                <a:ea typeface="+mn-lt"/>
-                <a:cs typeface="+mn-lt"/>
-              </a:rPr>
-              <a:t>của</a:t>
-            </a:r>
-            <a:r>
-              <a:rPr lang="en-US" sz="2000" dirty="0">
-                <a:latin typeface="Calibri"/>
-                <a:ea typeface="+mn-lt"/>
-                <a:cs typeface="+mn-lt"/>
-              </a:rPr>
-              <a:t> </a:t>
-            </a:r>
-            <a:r>
-              <a:rPr lang="en-US" sz="2000" dirty="0" err="1">
-                <a:latin typeface="Calibri"/>
-                <a:ea typeface="+mn-lt"/>
-                <a:cs typeface="+mn-lt"/>
-              </a:rPr>
-              <a:t>âm</a:t>
-            </a:r>
-            <a:r>
-              <a:rPr lang="en-US" sz="2000" dirty="0">
-                <a:latin typeface="Calibri"/>
-                <a:ea typeface="+mn-lt"/>
-                <a:cs typeface="+mn-lt"/>
-              </a:rPr>
-              <a:t> </a:t>
-            </a:r>
-            <a:r>
-              <a:rPr lang="en-US" sz="2000" dirty="0" err="1">
-                <a:latin typeface="Calibri"/>
-                <a:ea typeface="+mn-lt"/>
-                <a:cs typeface="+mn-lt"/>
-              </a:rPr>
-              <a:t>bắt</a:t>
-            </a:r>
-            <a:r>
-              <a:rPr lang="en-US" sz="2000" dirty="0">
-                <a:latin typeface="Calibri"/>
-                <a:ea typeface="+mn-lt"/>
-                <a:cs typeface="+mn-lt"/>
-              </a:rPr>
-              <a:t> </a:t>
-            </a:r>
-            <a:br>
-              <a:rPr lang="en-US" sz="2000" dirty="0">
-                <a:latin typeface="Calibri"/>
-                <a:ea typeface="+mn-lt"/>
-                <a:cs typeface="+mn-lt"/>
-              </a:rPr>
-            </a:br>
-            <a:r>
-              <a:rPr lang="en-US" sz="2000" dirty="0" err="1">
-                <a:latin typeface="Calibri"/>
-                <a:ea typeface="+mn-lt"/>
-                <a:cs typeface="+mn-lt"/>
-              </a:rPr>
-              <a:t>đầu</a:t>
-            </a:r>
-            <a:r>
-              <a:rPr lang="en-US" sz="2000" dirty="0">
-                <a:latin typeface="Calibri"/>
-                <a:ea typeface="+mn-lt"/>
-                <a:cs typeface="+mn-lt"/>
-              </a:rPr>
-              <a:t>. </a:t>
-            </a:r>
-            <a:r>
-              <a:rPr lang="en-US" sz="2000" dirty="0" err="1">
-                <a:latin typeface="Calibri"/>
-                <a:ea typeface="+mn-lt"/>
-                <a:cs typeface="+mn-lt"/>
-              </a:rPr>
-              <a:t>Mảng</a:t>
-            </a:r>
-            <a:r>
-              <a:rPr lang="en-US" sz="2000" dirty="0">
-                <a:latin typeface="Calibri"/>
-                <a:ea typeface="+mn-lt"/>
-                <a:cs typeface="+mn-lt"/>
-              </a:rPr>
-              <a:t> </a:t>
-            </a:r>
-            <a:r>
-              <a:rPr lang="en-US" sz="2000" dirty="0" err="1">
-                <a:latin typeface="Calibri"/>
-                <a:ea typeface="+mn-lt"/>
-                <a:cs typeface="+mn-lt"/>
-              </a:rPr>
-              <a:t>được</a:t>
-            </a:r>
-            <a:r>
-              <a:rPr lang="en-US" sz="2000" dirty="0">
-                <a:latin typeface="Calibri"/>
-                <a:ea typeface="+mn-lt"/>
-                <a:cs typeface="+mn-lt"/>
-              </a:rPr>
-              <a:t> </a:t>
-            </a:r>
-            <a:r>
-              <a:rPr lang="en-US" sz="2000" dirty="0" err="1">
-                <a:latin typeface="Calibri"/>
-                <a:ea typeface="+mn-lt"/>
-                <a:cs typeface="+mn-lt"/>
-              </a:rPr>
-              <a:t>sắp</a:t>
-            </a:r>
-            <a:r>
-              <a:rPr lang="en-US" sz="2000" dirty="0">
-                <a:latin typeface="Calibri"/>
-                <a:ea typeface="+mn-lt"/>
-                <a:cs typeface="+mn-lt"/>
-              </a:rPr>
-              <a:t> </a:t>
-            </a:r>
-            <a:r>
-              <a:rPr lang="en-US" sz="2000" dirty="0" err="1">
-                <a:latin typeface="Calibri"/>
-                <a:ea typeface="+mn-lt"/>
-                <a:cs typeface="+mn-lt"/>
-              </a:rPr>
-              <a:t>xếp</a:t>
-            </a:r>
-            <a:r>
-              <a:rPr lang="en-US" sz="2000" dirty="0">
-                <a:latin typeface="Calibri"/>
-                <a:ea typeface="+mn-lt"/>
-                <a:cs typeface="+mn-lt"/>
-              </a:rPr>
-              <a:t> </a:t>
-            </a:r>
-            <a:r>
-              <a:rPr lang="en-US" sz="2000" dirty="0" err="1">
-                <a:latin typeface="Calibri"/>
-                <a:ea typeface="+mn-lt"/>
-                <a:cs typeface="+mn-lt"/>
-              </a:rPr>
-              <a:t>tăng</a:t>
-            </a:r>
-            <a:r>
-              <a:rPr lang="en-US" sz="2000" dirty="0">
-                <a:latin typeface="Calibri"/>
-                <a:ea typeface="+mn-lt"/>
-                <a:cs typeface="+mn-lt"/>
-              </a:rPr>
-              <a:t> </a:t>
-            </a:r>
-            <a:r>
-              <a:rPr lang="en-US" sz="2000" dirty="0" err="1">
-                <a:latin typeface="Calibri"/>
-                <a:ea typeface="+mn-lt"/>
-                <a:cs typeface="+mn-lt"/>
-              </a:rPr>
-              <a:t>dần</a:t>
-            </a:r>
-            <a:r>
-              <a:rPr lang="en-US" sz="2000" dirty="0">
-                <a:latin typeface="Calibri"/>
-                <a:ea typeface="+mn-lt"/>
-                <a:cs typeface="+mn-lt"/>
-              </a:rPr>
-              <a:t> </a:t>
-            </a:r>
-            <a:r>
-              <a:rPr lang="en-US" sz="2000" dirty="0" err="1">
-                <a:latin typeface="Calibri"/>
-                <a:ea typeface="+mn-lt"/>
-                <a:cs typeface="+mn-lt"/>
-              </a:rPr>
-              <a:t>theo</a:t>
-            </a:r>
-            <a:r>
-              <a:rPr lang="en-US" sz="2000" dirty="0">
-                <a:latin typeface="Calibri"/>
-                <a:ea typeface="+mn-lt"/>
-                <a:cs typeface="+mn-lt"/>
-              </a:rPr>
-              <a:t> </a:t>
-            </a:r>
-            <a:r>
-              <a:rPr lang="en-US" sz="2000" dirty="0" err="1">
-                <a:latin typeface="Calibri"/>
-                <a:ea typeface="+mn-lt"/>
-                <a:cs typeface="+mn-lt"/>
-              </a:rPr>
-              <a:t>giá</a:t>
-            </a:r>
-            <a:r>
-              <a:rPr lang="en-US" sz="2000" dirty="0">
-                <a:latin typeface="Calibri"/>
-                <a:ea typeface="+mn-lt"/>
-                <a:cs typeface="+mn-lt"/>
-              </a:rPr>
-              <a:t> </a:t>
-            </a:r>
-            <a:br>
-              <a:rPr lang="en-US" sz="2000" dirty="0">
-                <a:latin typeface="Calibri"/>
-                <a:ea typeface="+mn-lt"/>
-                <a:cs typeface="+mn-lt"/>
-              </a:rPr>
-            </a:br>
-            <a:r>
-              <a:rPr lang="en-US" sz="2000" dirty="0" err="1">
-                <a:latin typeface="Calibri"/>
-                <a:ea typeface="+mn-lt"/>
-                <a:cs typeface="+mn-lt"/>
-              </a:rPr>
-              <a:t>trị</a:t>
-            </a:r>
-            <a:r>
-              <a:rPr lang="en-US" sz="2000" dirty="0">
-                <a:latin typeface="Calibri"/>
-                <a:ea typeface="+mn-lt"/>
-                <a:cs typeface="+mn-lt"/>
-              </a:rPr>
-              <a:t> </a:t>
-            </a:r>
-            <a:r>
-              <a:rPr lang="en-US" sz="2000" dirty="0" err="1">
-                <a:latin typeface="Calibri"/>
-                <a:ea typeface="+mn-lt"/>
-                <a:cs typeface="+mn-lt"/>
-              </a:rPr>
-              <a:t>mã</a:t>
-            </a:r>
-            <a:r>
-              <a:rPr lang="en-US" sz="2000" dirty="0">
-                <a:latin typeface="Calibri"/>
-                <a:ea typeface="+mn-lt"/>
-                <a:cs typeface="+mn-lt"/>
-              </a:rPr>
-              <a:t> </a:t>
-            </a:r>
-            <a:r>
-              <a:rPr lang="en-US" sz="2000" dirty="0" err="1">
-                <a:latin typeface="Calibri"/>
-                <a:ea typeface="+mn-lt"/>
-                <a:cs typeface="+mn-lt"/>
-              </a:rPr>
-              <a:t>hoá</a:t>
-            </a:r>
-            <a:r>
-              <a:rPr lang="en-US" sz="2000" dirty="0">
-                <a:latin typeface="Calibri"/>
-                <a:ea typeface="+mn-lt"/>
-                <a:cs typeface="+mn-lt"/>
-              </a:rPr>
-              <a:t> </a:t>
-            </a:r>
-            <a:r>
-              <a:rPr lang="en-US" sz="2000" dirty="0" err="1">
-                <a:latin typeface="Calibri"/>
-                <a:ea typeface="+mn-lt"/>
-                <a:cs typeface="+mn-lt"/>
-              </a:rPr>
-              <a:t>của</a:t>
-            </a:r>
-            <a:r>
-              <a:rPr lang="en-US" sz="2000" dirty="0">
-                <a:latin typeface="Calibri"/>
-                <a:ea typeface="+mn-lt"/>
-                <a:cs typeface="+mn-lt"/>
-              </a:rPr>
-              <a:t> </a:t>
-            </a:r>
-            <a:r>
-              <a:rPr lang="en-US" sz="2000" dirty="0" err="1">
-                <a:latin typeface="Calibri"/>
-                <a:ea typeface="+mn-lt"/>
-                <a:cs typeface="+mn-lt"/>
-              </a:rPr>
-              <a:t>âm</a:t>
-            </a:r>
-            <a:r>
-              <a:rPr lang="en-US" sz="2000" dirty="0">
-                <a:latin typeface="Calibri"/>
-                <a:ea typeface="+mn-lt"/>
-                <a:cs typeface="+mn-lt"/>
-              </a:rPr>
-              <a:t>.</a:t>
+              <a:t> 38877.</a:t>
             </a:r>
             <a:endParaRPr lang="en-US" sz="2000" dirty="0">
               <a:latin typeface="Calibri"/>
@@ -28735,235 +27955,755 @@
             <a:r>
               <a:rPr lang="en-US" sz="2000" dirty="0">
                 <a:latin typeface="Calibri"/>
-                <a:ea typeface="+mn-lt"/>
-                <a:cs typeface="+mn-lt"/>
-              </a:rPr>
-              <a:t>Hash function :  </a:t>
+                <a:cs typeface="Calibri"/>
+              </a:rPr>
+              <a:t>Key : </a:t>
             </a:r>
             <a:r>
               <a:rPr lang="en-US" sz="2000" dirty="0" err="1">
                 <a:latin typeface="Calibri"/>
-                <a:ea typeface="+mn-lt"/>
-                <a:cs typeface="+mn-lt"/>
-              </a:rPr>
-              <a:t>Hàm</a:t>
+                <a:cs typeface="Calibri"/>
+              </a:rPr>
+              <a:t>âm</a:t>
             </a:r>
             <a:r>
               <a:rPr lang="en-US" sz="2000" dirty="0">
                 <a:latin typeface="Calibri"/>
-                <a:ea typeface="+mn-lt"/>
-                <a:cs typeface="+mn-lt"/>
-              </a:rPr>
-              <a:t> </a:t>
+                <a:cs typeface="Calibri"/>
+              </a:rPr>
+              <a:t> </a:t>
             </a:r>
             <a:r>
               <a:rPr lang="en-US" sz="2000" dirty="0" err="1">
                 <a:latin typeface="Calibri"/>
-                <a:ea typeface="+mn-lt"/>
-                <a:cs typeface="+mn-lt"/>
-              </a:rPr>
-              <a:t>mã</a:t>
+                <a:cs typeface="Calibri"/>
+              </a:rPr>
+              <a:t>bắt</a:t>
             </a:r>
             <a:r>
               <a:rPr lang="en-US" sz="2000" dirty="0">
                 <a:latin typeface="Calibri"/>
-                <a:ea typeface="+mn-lt"/>
-                <a:cs typeface="+mn-lt"/>
-              </a:rPr>
-              <a:t> </a:t>
+                <a:cs typeface="Calibri"/>
+              </a:rPr>
+              <a:t> </a:t>
             </a:r>
             <a:r>
               <a:rPr lang="en-US" sz="2000" dirty="0" err="1">
                 <a:latin typeface="Calibri"/>
-                <a:ea typeface="+mn-lt"/>
-                <a:cs typeface="+mn-lt"/>
-              </a:rPr>
-              <a:t>hoá</a:t>
+                <a:cs typeface="Calibri"/>
+              </a:rPr>
+              <a:t>đầu</a:t>
             </a:r>
             <a:r>
               <a:rPr lang="en-US" sz="2000" dirty="0">
                 <a:latin typeface="Calibri"/>
-                <a:ea typeface="+mn-lt"/>
-                <a:cs typeface="+mn-lt"/>
-              </a:rPr>
-              <a:t> </a:t>
-            </a:r>
-            <a:r>
-              <a:rPr lang="en-US" sz="2000" dirty="0" err="1">
-                <a:latin typeface="Calibri"/>
-                <a:ea typeface="+mn-lt"/>
-                <a:cs typeface="+mn-lt"/>
-              </a:rPr>
-              <a:t>âm</a:t>
-            </a:r>
-            <a:r>
-              <a:rPr lang="en-US" sz="2000" dirty="0">
-                <a:latin typeface="Calibri"/>
-                <a:ea typeface="+mn-lt"/>
-                <a:cs typeface="+mn-lt"/>
-              </a:rPr>
-              <a:t> </a:t>
-            </a:r>
-            <a:r>
-              <a:rPr lang="en-US" sz="2000" dirty="0" err="1">
-                <a:latin typeface="Calibri"/>
-                <a:ea typeface="+mn-lt"/>
-                <a:cs typeface="+mn-lt"/>
-              </a:rPr>
-              <a:t>Tiếng</a:t>
-            </a:r>
-            <a:r>
-              <a:rPr lang="en-US" sz="2000" dirty="0">
-                <a:latin typeface="Calibri"/>
-                <a:ea typeface="+mn-lt"/>
-                <a:cs typeface="+mn-lt"/>
-              </a:rPr>
-              <a:t> Việt. </a:t>
-            </a:r>
-            <a:br>
-              <a:rPr lang="en-US" sz="2000" dirty="0">
-                <a:latin typeface="Calibri"/>
-                <a:ea typeface="+mn-lt"/>
-                <a:cs typeface="+mn-lt"/>
-              </a:rPr>
-            </a:br>
-            <a:r>
-              <a:rPr lang="en-US" sz="2000" dirty="0">
-                <a:latin typeface="Calibri"/>
-                <a:ea typeface="+mn-lt"/>
-                <a:cs typeface="+mn-lt"/>
-              </a:rPr>
-              <a:t>Giá </a:t>
-            </a:r>
-            <a:r>
-              <a:rPr lang="en-US" sz="2000" dirty="0" err="1">
-                <a:latin typeface="Calibri"/>
-                <a:ea typeface="+mn-lt"/>
-                <a:cs typeface="+mn-lt"/>
-              </a:rPr>
-              <a:t>trị</a:t>
-            </a:r>
-            <a:r>
-              <a:rPr lang="en-US" sz="2000" dirty="0">
-                <a:latin typeface="Calibri"/>
-                <a:ea typeface="+mn-lt"/>
-                <a:cs typeface="+mn-lt"/>
-              </a:rPr>
-              <a:t> </a:t>
-            </a:r>
-            <a:r>
-              <a:rPr lang="en-US" sz="2000" dirty="0" err="1">
-                <a:latin typeface="Calibri"/>
-                <a:ea typeface="+mn-lt"/>
-                <a:cs typeface="+mn-lt"/>
-              </a:rPr>
-              <a:t>trong</a:t>
-            </a:r>
-            <a:r>
-              <a:rPr lang="en-US" sz="2000" dirty="0">
-                <a:latin typeface="Calibri"/>
-                <a:ea typeface="+mn-lt"/>
-                <a:cs typeface="+mn-lt"/>
-              </a:rPr>
-              <a:t> </a:t>
-            </a:r>
-            <a:r>
-              <a:rPr lang="en-US" sz="2000" dirty="0" err="1">
-                <a:latin typeface="Calibri"/>
-                <a:ea typeface="+mn-lt"/>
-                <a:cs typeface="+mn-lt"/>
-              </a:rPr>
-              <a:t>đoạn</a:t>
-            </a:r>
-            <a:r>
-              <a:rPr lang="en-US" sz="2000" dirty="0">
-                <a:latin typeface="Calibri"/>
-                <a:ea typeface="+mn-lt"/>
-                <a:cs typeface="+mn-lt"/>
-              </a:rPr>
-              <a:t> </a:t>
-            </a:r>
-            <a:r>
-              <a:rPr lang="en-US" sz="2000" dirty="0" err="1">
-                <a:latin typeface="Calibri"/>
-                <a:ea typeface="+mn-lt"/>
-                <a:cs typeface="+mn-lt"/>
-              </a:rPr>
-              <a:t>từ</a:t>
-            </a:r>
-            <a:r>
-              <a:rPr lang="en-US" sz="2000" dirty="0">
-                <a:latin typeface="Calibri"/>
-                <a:ea typeface="+mn-lt"/>
-                <a:cs typeface="+mn-lt"/>
-              </a:rPr>
-              <a:t> 0 </a:t>
-            </a:r>
-            <a:r>
-              <a:rPr lang="en-US" sz="2000" dirty="0" err="1">
-                <a:latin typeface="Calibri"/>
-                <a:ea typeface="+mn-lt"/>
-                <a:cs typeface="+mn-lt"/>
-              </a:rPr>
-              <a:t>đến</a:t>
-            </a:r>
-            <a:r>
-              <a:rPr lang="en-US" sz="2000" dirty="0">
-                <a:latin typeface="Calibri"/>
-                <a:ea typeface="+mn-lt"/>
-                <a:cs typeface="+mn-lt"/>
-              </a:rPr>
-              <a:t> 38877.</a:t>
+                <a:cs typeface="Calibri"/>
+              </a:rPr>
+              <a:t>.</a:t>
             </a:r>
           </a:p>
           <a:p>
-            <a:pPr>
+            <a:pPr marL="731520" lvl="1" indent="-457200">
               <a:buClr>
                 <a:srgbClr val="262626"/>
               </a:buClr>
+              <a:buAutoNum type="arabicPeriod"/>
             </a:pPr>
             <a:r>
+              <a:rPr lang="en-US" sz="2000" dirty="0">
+                <a:latin typeface="Calibri"/>
+                <a:cs typeface="Calibri"/>
+              </a:rPr>
+              <a:t>Value : </a:t>
+            </a:r>
+            <a:r>
               <a:rPr lang="en-US" sz="2000" dirty="0" err="1">
                 <a:latin typeface="Calibri"/>
-                <a:cs typeface="Calibri"/>
-              </a:rPr>
-              <a:t>Đọc</a:t>
+                <a:ea typeface="+mn-lt"/>
+                <a:cs typeface="+mn-lt"/>
+              </a:rPr>
+              <a:t>Một</a:t>
             </a:r>
             <a:r>
               <a:rPr lang="en-US" sz="2000" dirty="0">
                 <a:latin typeface="Calibri"/>
-                <a:cs typeface="Calibri"/>
+                <a:ea typeface="+mn-lt"/>
+                <a:cs typeface="+mn-lt"/>
+              </a:rPr>
+              <a:t> </a:t>
+            </a:r>
+            <a:r>
+              <a:rPr lang="en-US" sz="2000" dirty="0" err="1">
+                <a:latin typeface="Calibri"/>
+                <a:ea typeface="+mn-lt"/>
+                <a:cs typeface="+mn-lt"/>
+              </a:rPr>
+              <a:t>danh</a:t>
+            </a:r>
+            <a:r>
+              <a:rPr lang="en-US" sz="2000" dirty="0">
+                <a:latin typeface="Calibri"/>
+                <a:ea typeface="+mn-lt"/>
+                <a:cs typeface="+mn-lt"/>
+              </a:rPr>
+              <a:t> </a:t>
+            </a:r>
+            <a:r>
+              <a:rPr lang="en-US" sz="2000" dirty="0" err="1">
+                <a:latin typeface="Calibri"/>
+                <a:ea typeface="+mn-lt"/>
+                <a:cs typeface="+mn-lt"/>
+              </a:rPr>
+              <a:t>sách</a:t>
+            </a:r>
+            <a:r>
+              <a:rPr lang="en-US" sz="2000" dirty="0">
+                <a:latin typeface="Calibri"/>
+                <a:ea typeface="+mn-lt"/>
+                <a:cs typeface="+mn-lt"/>
+              </a:rPr>
+              <a:t> </a:t>
+            </a:r>
+            <a:r>
+              <a:rPr lang="en-US" sz="2000" dirty="0" err="1">
+                <a:latin typeface="Calibri"/>
+                <a:ea typeface="+mn-lt"/>
+                <a:cs typeface="+mn-lt"/>
+              </a:rPr>
+              <a:t>mảng</a:t>
+            </a:r>
+            <a:r>
+              <a:rPr lang="en-US" sz="2000" dirty="0">
+                <a:latin typeface="Calibri"/>
+                <a:ea typeface="+mn-lt"/>
+                <a:cs typeface="+mn-lt"/>
+              </a:rPr>
+              <a:t> (con </a:t>
+            </a:r>
+            <a:r>
+              <a:rPr lang="en-US" sz="2000" dirty="0" err="1">
+                <a:latin typeface="Calibri"/>
+                <a:ea typeface="+mn-lt"/>
+                <a:cs typeface="+mn-lt"/>
+              </a:rPr>
+              <a:t>trỏ</a:t>
+            </a:r>
+            <a:r>
+              <a:rPr lang="en-US" sz="2000" dirty="0">
+                <a:latin typeface="Calibri"/>
+                <a:ea typeface="+mn-lt"/>
+                <a:cs typeface="+mn-lt"/>
+              </a:rPr>
+              <a:t>) </a:t>
+            </a:r>
+            <a:r>
+              <a:rPr lang="en-US" sz="2000" dirty="0" err="1">
+                <a:latin typeface="Calibri"/>
+                <a:ea typeface="+mn-lt"/>
+                <a:cs typeface="+mn-lt"/>
+              </a:rPr>
+              <a:t>chứa</a:t>
+            </a:r>
+            <a:r>
+              <a:rPr lang="en-US" sz="2000" dirty="0">
+                <a:latin typeface="Calibri"/>
+                <a:ea typeface="+mn-lt"/>
+                <a:cs typeface="+mn-lt"/>
+              </a:rPr>
+              <a:t> </a:t>
+            </a:r>
+            <a:br>
+              <a:rPr lang="en-US" sz="2000" dirty="0">
+                <a:latin typeface="Calibri"/>
+                <a:ea typeface="+mn-lt"/>
+                <a:cs typeface="+mn-lt"/>
+              </a:rPr>
+            </a:br>
+            <a:r>
+              <a:rPr lang="en-US" sz="2000" dirty="0" err="1">
+                <a:latin typeface="Calibri"/>
+                <a:ea typeface="+mn-lt"/>
+                <a:cs typeface="+mn-lt"/>
+              </a:rPr>
+              <a:t>các</a:t>
+            </a:r>
+            <a:r>
+              <a:rPr lang="en-US" sz="2000" dirty="0">
+                <a:latin typeface="Calibri"/>
+                <a:ea typeface="+mn-lt"/>
+                <a:cs typeface="+mn-lt"/>
+              </a:rPr>
+              <a:t> </a:t>
+            </a:r>
+            <a:r>
+              <a:rPr lang="en-US" sz="2000" dirty="0" err="1">
+                <a:latin typeface="Calibri"/>
+                <a:ea typeface="+mn-lt"/>
+                <a:cs typeface="+mn-lt"/>
+              </a:rPr>
+              <a:t>mã</a:t>
+            </a:r>
+            <a:r>
+              <a:rPr lang="en-US" sz="2000" dirty="0">
+                <a:latin typeface="Calibri"/>
+                <a:ea typeface="+mn-lt"/>
+                <a:cs typeface="+mn-lt"/>
+              </a:rPr>
+              <a:t> </a:t>
+            </a:r>
+            <a:r>
+              <a:rPr lang="en-US" sz="2000" dirty="0" err="1">
+                <a:latin typeface="Calibri"/>
+                <a:ea typeface="+mn-lt"/>
+                <a:cs typeface="+mn-lt"/>
+              </a:rPr>
+              <a:t>hoá</a:t>
+            </a:r>
+            <a:r>
+              <a:rPr lang="en-US" sz="2000" dirty="0">
+                <a:latin typeface="Calibri"/>
+                <a:ea typeface="+mn-lt"/>
+                <a:cs typeface="+mn-lt"/>
+              </a:rPr>
+              <a:t> </a:t>
+            </a:r>
+            <a:r>
+              <a:rPr lang="en-US" sz="2000" dirty="0" err="1">
+                <a:latin typeface="Calibri"/>
+                <a:ea typeface="+mn-lt"/>
+                <a:cs typeface="+mn-lt"/>
+              </a:rPr>
+              <a:t>của</a:t>
+            </a:r>
+            <a:r>
+              <a:rPr lang="en-US" sz="2000" dirty="0">
+                <a:latin typeface="Calibri"/>
+                <a:ea typeface="+mn-lt"/>
+                <a:cs typeface="+mn-lt"/>
+              </a:rPr>
+              <a:t> </a:t>
+            </a:r>
+            <a:r>
+              <a:rPr lang="en-US" sz="2000" dirty="0" err="1">
+                <a:latin typeface="Calibri"/>
+                <a:ea typeface="+mn-lt"/>
+                <a:cs typeface="+mn-lt"/>
+              </a:rPr>
+              <a:t>các</a:t>
+            </a:r>
+            <a:r>
+              <a:rPr lang="en-US" sz="2000" dirty="0">
+                <a:latin typeface="Calibri"/>
+                <a:ea typeface="+mn-lt"/>
+                <a:cs typeface="+mn-lt"/>
+              </a:rPr>
+              <a:t> </a:t>
+            </a:r>
+            <a:r>
+              <a:rPr lang="en-US" sz="2000" dirty="0" err="1">
+                <a:latin typeface="Calibri"/>
+                <a:ea typeface="+mn-lt"/>
+                <a:cs typeface="+mn-lt"/>
+              </a:rPr>
+              <a:t>âm</a:t>
+            </a:r>
+            <a:r>
+              <a:rPr lang="en-US" sz="2000" dirty="0">
+                <a:latin typeface="Calibri"/>
+                <a:ea typeface="+mn-lt"/>
+                <a:cs typeface="+mn-lt"/>
+              </a:rPr>
+              <a:t> </a:t>
+            </a:r>
+            <a:r>
+              <a:rPr lang="en-US" sz="2000" dirty="0" err="1">
+                <a:latin typeface="Calibri"/>
+                <a:ea typeface="+mn-lt"/>
+                <a:cs typeface="+mn-lt"/>
+              </a:rPr>
+              <a:t>kết</a:t>
+            </a:r>
+            <a:r>
+              <a:rPr lang="en-US" sz="2000" dirty="0">
+                <a:latin typeface="Calibri"/>
+                <a:ea typeface="+mn-lt"/>
+                <a:cs typeface="+mn-lt"/>
+              </a:rPr>
+              <a:t> </a:t>
+            </a:r>
+            <a:r>
+              <a:rPr lang="en-US" sz="2000" dirty="0" err="1">
+                <a:latin typeface="Calibri"/>
+                <a:ea typeface="+mn-lt"/>
+                <a:cs typeface="+mn-lt"/>
+              </a:rPr>
+              <a:t>thúc</a:t>
+            </a:r>
+            <a:r>
+              <a:rPr lang="en-US" sz="2000" dirty="0">
+                <a:latin typeface="Calibri"/>
+                <a:ea typeface="+mn-lt"/>
+                <a:cs typeface="+mn-lt"/>
+              </a:rPr>
+              <a:t> </a:t>
+            </a:r>
+            <a:r>
+              <a:rPr lang="en-US" sz="2000" dirty="0" err="1">
+                <a:latin typeface="Calibri"/>
+                <a:ea typeface="+mn-lt"/>
+                <a:cs typeface="+mn-lt"/>
+              </a:rPr>
+              <a:t>của</a:t>
+            </a:r>
+            <a:r>
+              <a:rPr lang="en-US" sz="2000" dirty="0">
+                <a:latin typeface="Calibri"/>
+                <a:ea typeface="+mn-lt"/>
+                <a:cs typeface="+mn-lt"/>
+              </a:rPr>
+              <a:t> </a:t>
+            </a:r>
+            <a:r>
+              <a:rPr lang="en-US" sz="2000" dirty="0" err="1">
+                <a:latin typeface="Calibri"/>
+                <a:ea typeface="+mn-lt"/>
+                <a:cs typeface="+mn-lt"/>
+              </a:rPr>
+              <a:t>các</a:t>
+            </a:r>
+            <a:r>
+              <a:rPr lang="en-US" sz="2000" dirty="0">
+                <a:latin typeface="Calibri"/>
+                <a:ea typeface="+mn-lt"/>
+                <a:cs typeface="+mn-lt"/>
+              </a:rPr>
+              <a:t> </a:t>
+            </a:r>
+            <a:r>
+              <a:rPr lang="en-US" sz="2000" dirty="0" err="1">
+                <a:latin typeface="Calibri"/>
+                <a:ea typeface="+mn-lt"/>
+                <a:cs typeface="+mn-lt"/>
+              </a:rPr>
+              <a:t>từ</a:t>
+            </a:r>
+            <a:r>
+              <a:rPr lang="en-US" sz="2000" dirty="0">
+                <a:latin typeface="Calibri"/>
+                <a:ea typeface="+mn-lt"/>
+                <a:cs typeface="+mn-lt"/>
+              </a:rPr>
+              <a:t> </a:t>
+            </a:r>
+            <a:br>
+              <a:rPr lang="en-US" sz="2000" dirty="0">
+                <a:latin typeface="Calibri"/>
+                <a:ea typeface="+mn-lt"/>
+                <a:cs typeface="+mn-lt"/>
+              </a:rPr>
+            </a:br>
+            <a:r>
+              <a:rPr lang="en-US" sz="2000" dirty="0" err="1">
+                <a:latin typeface="Calibri"/>
+                <a:ea typeface="+mn-lt"/>
+                <a:cs typeface="+mn-lt"/>
+              </a:rPr>
+              <a:t>vựng</a:t>
+            </a:r>
+            <a:r>
+              <a:rPr lang="en-US" sz="2000" dirty="0">
+                <a:latin typeface="Calibri"/>
+                <a:ea typeface="+mn-lt"/>
+                <a:cs typeface="+mn-lt"/>
+              </a:rPr>
+              <a:t> </a:t>
+            </a:r>
+            <a:r>
+              <a:rPr lang="en-US" sz="2000" dirty="0" err="1">
+                <a:latin typeface="Calibri"/>
+                <a:ea typeface="+mn-lt"/>
+                <a:cs typeface="+mn-lt"/>
+              </a:rPr>
+              <a:t>tương</a:t>
+            </a:r>
+            <a:r>
+              <a:rPr lang="en-US" sz="2000" dirty="0">
+                <a:latin typeface="Calibri"/>
+                <a:ea typeface="+mn-lt"/>
+                <a:cs typeface="+mn-lt"/>
+              </a:rPr>
+              <a:t> </a:t>
+            </a:r>
+            <a:r>
+              <a:rPr lang="en-US" sz="2000" dirty="0" err="1">
+                <a:latin typeface="Calibri"/>
+                <a:ea typeface="+mn-lt"/>
+                <a:cs typeface="+mn-lt"/>
+              </a:rPr>
+              <a:t>ứng</a:t>
+            </a:r>
+            <a:r>
+              <a:rPr lang="en-US" sz="2000" dirty="0">
+                <a:latin typeface="Calibri"/>
+                <a:ea typeface="+mn-lt"/>
+                <a:cs typeface="+mn-lt"/>
+              </a:rPr>
+              <a:t> </a:t>
+            </a:r>
+            <a:r>
+              <a:rPr lang="en-US" sz="2000" dirty="0" err="1">
+                <a:latin typeface="Calibri"/>
+                <a:ea typeface="+mn-lt"/>
+                <a:cs typeface="+mn-lt"/>
+              </a:rPr>
+              <a:t>với</a:t>
+            </a:r>
+            <a:r>
+              <a:rPr lang="en-US" sz="2000" dirty="0">
+                <a:latin typeface="Calibri"/>
+                <a:ea typeface="+mn-lt"/>
+                <a:cs typeface="+mn-lt"/>
+              </a:rPr>
+              <a:t> </a:t>
+            </a:r>
+            <a:r>
+              <a:rPr lang="en-US" sz="2000" dirty="0" err="1">
+                <a:latin typeface="Calibri"/>
+                <a:ea typeface="+mn-lt"/>
+                <a:cs typeface="+mn-lt"/>
+              </a:rPr>
+              <a:t>giá</a:t>
+            </a:r>
+            <a:r>
+              <a:rPr lang="en-US" sz="2000" dirty="0">
+                <a:latin typeface="Calibri"/>
+                <a:ea typeface="+mn-lt"/>
+                <a:cs typeface="+mn-lt"/>
+              </a:rPr>
+              <a:t> </a:t>
+            </a:r>
+            <a:r>
+              <a:rPr lang="en-US" sz="2000" dirty="0" err="1">
+                <a:latin typeface="Calibri"/>
+                <a:ea typeface="+mn-lt"/>
+                <a:cs typeface="+mn-lt"/>
+              </a:rPr>
+              <a:t>trị</a:t>
+            </a:r>
+            <a:r>
+              <a:rPr lang="en-US" sz="2000" dirty="0">
+                <a:latin typeface="Calibri"/>
+                <a:ea typeface="+mn-lt"/>
+                <a:cs typeface="+mn-lt"/>
+              </a:rPr>
+              <a:t> </a:t>
+            </a:r>
+            <a:r>
+              <a:rPr lang="en-US" sz="2000" dirty="0" err="1">
+                <a:latin typeface="Calibri"/>
+                <a:ea typeface="+mn-lt"/>
+                <a:cs typeface="+mn-lt"/>
+              </a:rPr>
+              <a:t>băm</a:t>
+            </a:r>
+            <a:r>
+              <a:rPr lang="en-US" sz="2000" dirty="0">
+                <a:latin typeface="Calibri"/>
+                <a:ea typeface="+mn-lt"/>
+                <a:cs typeface="+mn-lt"/>
+              </a:rPr>
+              <a:t> </a:t>
+            </a:r>
+            <a:r>
+              <a:rPr lang="en-US" sz="2000" dirty="0" err="1">
+                <a:latin typeface="Calibri"/>
+                <a:ea typeface="+mn-lt"/>
+                <a:cs typeface="+mn-lt"/>
+              </a:rPr>
+              <a:t>của</a:t>
+            </a:r>
+            <a:r>
+              <a:rPr lang="en-US" sz="2000" dirty="0">
+                <a:latin typeface="Calibri"/>
+                <a:ea typeface="+mn-lt"/>
+                <a:cs typeface="+mn-lt"/>
+              </a:rPr>
+              <a:t> </a:t>
+            </a:r>
+            <a:r>
+              <a:rPr lang="en-US" sz="2000" dirty="0" err="1">
+                <a:latin typeface="Calibri"/>
+                <a:ea typeface="+mn-lt"/>
+                <a:cs typeface="+mn-lt"/>
+              </a:rPr>
+              <a:t>âm</a:t>
+            </a:r>
+            <a:r>
+              <a:rPr lang="en-US" sz="2000" dirty="0">
+                <a:latin typeface="Calibri"/>
+                <a:ea typeface="+mn-lt"/>
+                <a:cs typeface="+mn-lt"/>
+              </a:rPr>
+              <a:t> </a:t>
+            </a:r>
+            <a:r>
+              <a:rPr lang="en-US" sz="2000" dirty="0" err="1">
+                <a:latin typeface="Calibri"/>
+                <a:ea typeface="+mn-lt"/>
+                <a:cs typeface="+mn-lt"/>
+              </a:rPr>
+              <a:t>bắt</a:t>
+            </a:r>
+            <a:r>
+              <a:rPr lang="en-US" sz="2000" dirty="0">
+                <a:latin typeface="Calibri"/>
+                <a:ea typeface="+mn-lt"/>
+                <a:cs typeface="+mn-lt"/>
+              </a:rPr>
+              <a:t> </a:t>
+            </a:r>
+            <a:br>
+              <a:rPr lang="en-US" sz="2000" dirty="0">
+                <a:latin typeface="Calibri"/>
+                <a:ea typeface="+mn-lt"/>
+                <a:cs typeface="+mn-lt"/>
+              </a:rPr>
+            </a:br>
+            <a:r>
+              <a:rPr lang="en-US" sz="2000" dirty="0" err="1">
+                <a:latin typeface="Calibri"/>
+                <a:ea typeface="+mn-lt"/>
+                <a:cs typeface="+mn-lt"/>
+              </a:rPr>
+              <a:t>đầu</a:t>
+            </a:r>
+            <a:r>
+              <a:rPr lang="en-US" sz="2000" dirty="0">
+                <a:latin typeface="Calibri"/>
+                <a:ea typeface="+mn-lt"/>
+                <a:cs typeface="+mn-lt"/>
+              </a:rPr>
+              <a:t>. </a:t>
+            </a:r>
+            <a:r>
+              <a:rPr lang="en-US" sz="2000" dirty="0" err="1">
+                <a:latin typeface="Calibri"/>
+                <a:ea typeface="+mn-lt"/>
+                <a:cs typeface="+mn-lt"/>
+              </a:rPr>
+              <a:t>Mảng</a:t>
+            </a:r>
+            <a:r>
+              <a:rPr lang="en-US" sz="2000" dirty="0">
+                <a:latin typeface="Calibri"/>
+                <a:ea typeface="+mn-lt"/>
+                <a:cs typeface="+mn-lt"/>
+              </a:rPr>
+              <a:t> </a:t>
+            </a:r>
+            <a:r>
+              <a:rPr lang="en-US" sz="2000" dirty="0" err="1">
+                <a:latin typeface="Calibri"/>
+                <a:ea typeface="+mn-lt"/>
+                <a:cs typeface="+mn-lt"/>
+              </a:rPr>
+              <a:t>được</a:t>
+            </a:r>
+            <a:r>
+              <a:rPr lang="en-US" sz="2000" dirty="0">
+                <a:latin typeface="Calibri"/>
+                <a:ea typeface="+mn-lt"/>
+                <a:cs typeface="+mn-lt"/>
+              </a:rPr>
+              <a:t> </a:t>
+            </a:r>
+            <a:r>
+              <a:rPr lang="en-US" sz="2000" dirty="0" err="1">
+                <a:latin typeface="Calibri"/>
+                <a:ea typeface="+mn-lt"/>
+                <a:cs typeface="+mn-lt"/>
+              </a:rPr>
+              <a:t>sắp</a:t>
+            </a:r>
+            <a:r>
+              <a:rPr lang="en-US" sz="2000" dirty="0">
+                <a:latin typeface="Calibri"/>
+                <a:ea typeface="+mn-lt"/>
+                <a:cs typeface="+mn-lt"/>
+              </a:rPr>
+              <a:t> </a:t>
+            </a:r>
+            <a:r>
+              <a:rPr lang="en-US" sz="2000" dirty="0" err="1">
+                <a:latin typeface="Calibri"/>
+                <a:ea typeface="+mn-lt"/>
+                <a:cs typeface="+mn-lt"/>
+              </a:rPr>
+              <a:t>xếp</a:t>
+            </a:r>
+            <a:r>
+              <a:rPr lang="en-US" sz="2000" dirty="0">
+                <a:latin typeface="Calibri"/>
+                <a:ea typeface="+mn-lt"/>
+                <a:cs typeface="+mn-lt"/>
+              </a:rPr>
+              <a:t> </a:t>
+            </a:r>
+            <a:r>
+              <a:rPr lang="en-US" sz="2000" dirty="0" err="1">
+                <a:latin typeface="Calibri"/>
+                <a:ea typeface="+mn-lt"/>
+                <a:cs typeface="+mn-lt"/>
+              </a:rPr>
+              <a:t>tăng</a:t>
+            </a:r>
+            <a:r>
+              <a:rPr lang="en-US" sz="2000" dirty="0">
+                <a:latin typeface="Calibri"/>
+                <a:ea typeface="+mn-lt"/>
+                <a:cs typeface="+mn-lt"/>
+              </a:rPr>
+              <a:t> </a:t>
+            </a:r>
+            <a:r>
+              <a:rPr lang="en-US" sz="2000" dirty="0" err="1">
+                <a:latin typeface="Calibri"/>
+                <a:ea typeface="+mn-lt"/>
+                <a:cs typeface="+mn-lt"/>
+              </a:rPr>
+              <a:t>dần</a:t>
+            </a:r>
+            <a:r>
+              <a:rPr lang="en-US" sz="2000" dirty="0">
+                <a:latin typeface="Calibri"/>
+                <a:ea typeface="+mn-lt"/>
+                <a:cs typeface="+mn-lt"/>
+              </a:rPr>
+              <a:t> </a:t>
+            </a:r>
+            <a:r>
+              <a:rPr lang="en-US" sz="2000" dirty="0" err="1">
+                <a:latin typeface="Calibri"/>
+                <a:ea typeface="+mn-lt"/>
+                <a:cs typeface="+mn-lt"/>
+              </a:rPr>
+              <a:t>theo</a:t>
+            </a:r>
+            <a:r>
+              <a:rPr lang="en-US" sz="2000" dirty="0">
+                <a:latin typeface="Calibri"/>
+                <a:ea typeface="+mn-lt"/>
+                <a:cs typeface="+mn-lt"/>
+              </a:rPr>
+              <a:t> </a:t>
+            </a:r>
+            <a:r>
+              <a:rPr lang="en-US" sz="2000" dirty="0" err="1">
+                <a:latin typeface="Calibri"/>
+                <a:ea typeface="+mn-lt"/>
+                <a:cs typeface="+mn-lt"/>
+              </a:rPr>
+              <a:t>giá</a:t>
+            </a:r>
+            <a:r>
+              <a:rPr lang="en-US" sz="2000" dirty="0">
+                <a:latin typeface="Calibri"/>
+                <a:ea typeface="+mn-lt"/>
+                <a:cs typeface="+mn-lt"/>
+              </a:rPr>
+              <a:t> </a:t>
+            </a:r>
+            <a:br>
+              <a:rPr lang="en-US" sz="2000" dirty="0">
+                <a:latin typeface="Calibri"/>
+                <a:ea typeface="+mn-lt"/>
+                <a:cs typeface="+mn-lt"/>
+              </a:rPr>
+            </a:br>
+            <a:r>
+              <a:rPr lang="en-US" sz="2000" dirty="0" err="1">
+                <a:latin typeface="Calibri"/>
+                <a:ea typeface="+mn-lt"/>
+                <a:cs typeface="+mn-lt"/>
+              </a:rPr>
+              <a:t>trị</a:t>
+            </a:r>
+            <a:r>
+              <a:rPr lang="en-US" sz="2000" dirty="0">
+                <a:latin typeface="Calibri"/>
+                <a:ea typeface="+mn-lt"/>
+                <a:cs typeface="+mn-lt"/>
               </a:rPr>
               <a:t> </a:t>
             </a:r>
             <a:r>
               <a:rPr lang="en-US" sz="2000" dirty="0" err="1">
                 <a:latin typeface="Calibri"/>
-                <a:cs typeface="Calibri"/>
-              </a:rPr>
-              <a:t>từ</a:t>
+                <a:ea typeface="+mn-lt"/>
+                <a:cs typeface="+mn-lt"/>
+              </a:rPr>
+              <a:t>mã</a:t>
             </a:r>
             <a:r>
               <a:rPr lang="en-US" sz="2000" dirty="0">
                 <a:latin typeface="Calibri"/>
-                <a:cs typeface="Calibri"/>
-              </a:rPr>
-              <a:t> </a:t>
+                <a:ea typeface="+mn-lt"/>
+                <a:cs typeface="+mn-lt"/>
+              </a:rPr>
+              <a:t> </a:t>
             </a:r>
             <a:r>
               <a:rPr lang="en-US" sz="2000" dirty="0" err="1">
                 <a:latin typeface="Calibri"/>
-                <a:cs typeface="Calibri"/>
-              </a:rPr>
-              <a:t>tệp</a:t>
+                <a:ea typeface="+mn-lt"/>
+                <a:cs typeface="+mn-lt"/>
+              </a:rPr>
+              <a:t>hoá</a:t>
             </a:r>
             <a:r>
               <a:rPr lang="en-US" sz="2000" dirty="0">
                 <a:latin typeface="Calibri"/>
-                <a:cs typeface="Calibri"/>
-              </a:rPr>
-              <a:t> dictionary.txt.</a:t>
-            </a:r>
+                <a:ea typeface="+mn-lt"/>
+                <a:cs typeface="+mn-lt"/>
+              </a:rPr>
+              <a:t> </a:t>
+            </a:r>
+            <a:r>
+              <a:rPr lang="en-US" sz="2000" dirty="0" err="1">
+                <a:latin typeface="Calibri"/>
+                <a:ea typeface="+mn-lt"/>
+                <a:cs typeface="+mn-lt"/>
+              </a:rPr>
+              <a:t>của</a:t>
+            </a:r>
+            <a:r>
+              <a:rPr lang="en-US" sz="2000" dirty="0">
+                <a:latin typeface="Calibri"/>
+                <a:ea typeface="+mn-lt"/>
+                <a:cs typeface="+mn-lt"/>
+              </a:rPr>
+              <a:t> </a:t>
+            </a:r>
+            <a:r>
+              <a:rPr lang="en-US" sz="2000" dirty="0" err="1">
+                <a:latin typeface="Calibri"/>
+                <a:ea typeface="+mn-lt"/>
+                <a:cs typeface="+mn-lt"/>
+              </a:rPr>
+              <a:t>âm</a:t>
+            </a:r>
+            <a:r>
+              <a:rPr lang="en-US" sz="2000" dirty="0">
+                <a:latin typeface="Calibri"/>
+                <a:ea typeface="+mn-lt"/>
+                <a:cs typeface="+mn-lt"/>
+              </a:rPr>
+              <a:t>.</a:t>
+            </a:r>
+            <a:endParaRPr lang="en-US" sz="2000" dirty="0">
+              <a:latin typeface="Calibri"/>
+              <a:cs typeface="Calibri"/>
+            </a:endParaRPr>
           </a:p>
         </p:txBody>
       </p:sp>

</xml_diff>